<commit_message>
updated bootstrapping + some slides
</commit_message>
<xml_diff>
--- a/BLOSUMscoresComparedToSingleSNAPscores.pptx
+++ b/BLOSUMscoresComparedToSingleSNAPscores.pptx
@@ -5,7 +5,7 @@
     <p:sldMasterId id="2147483648" r:id="rId1"/>
   </p:sldMasterIdLst>
   <p:notesMasterIdLst>
-    <p:notesMasterId r:id="rId24"/>
+    <p:notesMasterId r:id="rId26"/>
   </p:notesMasterIdLst>
   <p:sldIdLst>
     <p:sldId id="256" r:id="rId2"/>
@@ -13,23 +13,25 @@
     <p:sldId id="273" r:id="rId4"/>
     <p:sldId id="258" r:id="rId5"/>
     <p:sldId id="259" r:id="rId6"/>
-    <p:sldId id="260" r:id="rId7"/>
-    <p:sldId id="261" r:id="rId8"/>
-    <p:sldId id="262" r:id="rId9"/>
-    <p:sldId id="263" r:id="rId10"/>
-    <p:sldId id="268" r:id="rId11"/>
-    <p:sldId id="269" r:id="rId12"/>
-    <p:sldId id="270" r:id="rId13"/>
-    <p:sldId id="271" r:id="rId14"/>
-    <p:sldId id="264" r:id="rId15"/>
-    <p:sldId id="257" r:id="rId16"/>
-    <p:sldId id="267" r:id="rId17"/>
-    <p:sldId id="277" r:id="rId18"/>
-    <p:sldId id="266" r:id="rId19"/>
-    <p:sldId id="276" r:id="rId20"/>
-    <p:sldId id="275" r:id="rId21"/>
-    <p:sldId id="265" r:id="rId22"/>
-    <p:sldId id="274" r:id="rId23"/>
+    <p:sldId id="279" r:id="rId7"/>
+    <p:sldId id="260" r:id="rId8"/>
+    <p:sldId id="261" r:id="rId9"/>
+    <p:sldId id="262" r:id="rId10"/>
+    <p:sldId id="278" r:id="rId11"/>
+    <p:sldId id="263" r:id="rId12"/>
+    <p:sldId id="268" r:id="rId13"/>
+    <p:sldId id="269" r:id="rId14"/>
+    <p:sldId id="270" r:id="rId15"/>
+    <p:sldId id="271" r:id="rId16"/>
+    <p:sldId id="264" r:id="rId17"/>
+    <p:sldId id="257" r:id="rId18"/>
+    <p:sldId id="267" r:id="rId19"/>
+    <p:sldId id="277" r:id="rId20"/>
+    <p:sldId id="266" r:id="rId21"/>
+    <p:sldId id="276" r:id="rId22"/>
+    <p:sldId id="275" r:id="rId23"/>
+    <p:sldId id="265" r:id="rId24"/>
+    <p:sldId id="274" r:id="rId25"/>
   </p:sldIdLst>
   <p:sldSz cx="12192000" cy="6858000"/>
   <p:notesSz cx="6858000" cy="9144000"/>
@@ -377,7 +379,7 @@
           <a:p>
             <a:fld id="{BD6544A4-5AEA-4FD1-BFF4-C7493F24BB4E}" type="slidenum">
               <a:rPr lang="en-US" smtClean="0"/>
-              <a:t>‹#›</a:t>
+              <a:t>‹Nr.›</a:t>
             </a:fld>
             <a:endParaRPr lang="en-US"/>
           </a:p>
@@ -694,7 +696,7 @@
             <a:fld id="{B38A1AC8-FB3F-493B-87B4-B9C3F07C4D88}" type="slidenum">
               <a:rPr lang="en-US" smtClean="0"/>
               <a:pPr/>
-              <a:t>‹#›</a:t>
+              <a:t>‹Nr.›</a:t>
             </a:fld>
             <a:endParaRPr lang="en-US" dirty="0"/>
           </a:p>
@@ -965,7 +967,7 @@
           <a:p>
             <a:fld id="{CCAAE293-A3DA-4FFC-871C-7F0F209F7CB2}" type="slidenum">
               <a:rPr lang="en-US" smtClean="0"/>
-              <a:t>‹#›</a:t>
+              <a:t>‹Nr.›</a:t>
             </a:fld>
             <a:endParaRPr lang="en-US"/>
           </a:p>
@@ -1175,7 +1177,7 @@
           <a:p>
             <a:fld id="{CCAAE293-A3DA-4FFC-871C-7F0F209F7CB2}" type="slidenum">
               <a:rPr lang="en-US" smtClean="0"/>
-              <a:t>‹#›</a:t>
+              <a:t>‹Nr.›</a:t>
             </a:fld>
             <a:endParaRPr lang="en-US"/>
           </a:p>
@@ -1375,7 +1377,7 @@
           <a:p>
             <a:fld id="{CCAAE293-A3DA-4FFC-871C-7F0F209F7CB2}" type="slidenum">
               <a:rPr lang="en-US" smtClean="0"/>
-              <a:t>‹#›</a:t>
+              <a:t>‹Nr.›</a:t>
             </a:fld>
             <a:endParaRPr lang="en-US"/>
           </a:p>
@@ -1717,7 +1719,7 @@
           <a:p>
             <a:fld id="{CCAAE293-A3DA-4FFC-871C-7F0F209F7CB2}" type="slidenum">
               <a:rPr lang="en-US" smtClean="0"/>
-              <a:t>‹#›</a:t>
+              <a:t>‹Nr.›</a:t>
             </a:fld>
             <a:endParaRPr lang="en-US"/>
           </a:p>
@@ -1985,7 +1987,7 @@
           <a:p>
             <a:fld id="{CCAAE293-A3DA-4FFC-871C-7F0F209F7CB2}" type="slidenum">
               <a:rPr lang="en-US" smtClean="0"/>
-              <a:t>‹#›</a:t>
+              <a:t>‹Nr.›</a:t>
             </a:fld>
             <a:endParaRPr lang="en-US"/>
           </a:p>
@@ -2471,7 +2473,7 @@
           <a:p>
             <a:fld id="{CCAAE293-A3DA-4FFC-871C-7F0F209F7CB2}" type="slidenum">
               <a:rPr lang="en-US" smtClean="0"/>
-              <a:t>‹#›</a:t>
+              <a:t>‹Nr.›</a:t>
             </a:fld>
             <a:endParaRPr lang="en-US"/>
           </a:p>
@@ -2613,7 +2615,7 @@
           <a:p>
             <a:fld id="{CCAAE293-A3DA-4FFC-871C-7F0F209F7CB2}" type="slidenum">
               <a:rPr lang="en-US" smtClean="0"/>
-              <a:t>‹#›</a:t>
+              <a:t>‹Nr.›</a:t>
             </a:fld>
             <a:endParaRPr lang="en-US"/>
           </a:p>
@@ -2726,7 +2728,7 @@
           <a:p>
             <a:fld id="{CCAAE293-A3DA-4FFC-871C-7F0F209F7CB2}" type="slidenum">
               <a:rPr lang="en-US" smtClean="0"/>
-              <a:t>‹#›</a:t>
+              <a:t>‹Nr.›</a:t>
             </a:fld>
             <a:endParaRPr lang="en-US"/>
           </a:p>
@@ -3039,7 +3041,7 @@
           <a:p>
             <a:fld id="{CCAAE293-A3DA-4FFC-871C-7F0F209F7CB2}" type="slidenum">
               <a:rPr lang="en-US" smtClean="0"/>
-              <a:t>‹#›</a:t>
+              <a:t>‹Nr.›</a:t>
             </a:fld>
             <a:endParaRPr lang="en-US"/>
           </a:p>
@@ -3328,7 +3330,7 @@
           <a:p>
             <a:fld id="{CCAAE293-A3DA-4FFC-871C-7F0F209F7CB2}" type="slidenum">
               <a:rPr lang="en-US" smtClean="0"/>
-              <a:t>‹#›</a:t>
+              <a:t>‹Nr.›</a:t>
             </a:fld>
             <a:endParaRPr lang="en-US"/>
           </a:p>
@@ -3607,7 +3609,7 @@
           <a:p>
             <a:fld id="{CCAAE293-A3DA-4FFC-871C-7F0F209F7CB2}" type="slidenum">
               <a:rPr lang="en-US" smtClean="0"/>
-              <a:t>‹#›</a:t>
+              <a:t>‹Nr.›</a:t>
             </a:fld>
             <a:endParaRPr lang="en-US"/>
           </a:p>
@@ -4099,10 +4101,10 @@
       </p:grpSpPr>
       <p:sp>
         <p:nvSpPr>
-          <p:cNvPr id="5" name="Titel 4">
-            <a:extLst>
-              <a:ext uri="{FF2B5EF4-FFF2-40B4-BE49-F238E27FC236}">
-                <a16:creationId xmlns:a16="http://schemas.microsoft.com/office/drawing/2014/main" id="{ACFF07FE-4BFA-4138-9A63-E2152340D587}"/>
+          <p:cNvPr id="2" name="Titel 1">
+            <a:extLst>
+              <a:ext uri="{FF2B5EF4-FFF2-40B4-BE49-F238E27FC236}">
+                <a16:creationId xmlns:a16="http://schemas.microsoft.com/office/drawing/2014/main" id="{0443C47C-4423-4E72-B3BD-FC90A9A178BE}"/>
               </a:ext>
             </a:extLst>
           </p:cNvPr>
@@ -4121,31 +4123,117 @@
             <a:pPr algn="ctr"/>
             <a:r>
               <a:rPr lang="de-DE" dirty="0"/>
-              <a:t>Hyperparameter: Grid </a:t>
+              <a:t>Training </a:t>
             </a:r>
             <a:r>
               <a:rPr lang="de-DE" dirty="0" err="1"/>
-              <a:t>search</a:t>
+              <a:t>dataset</a:t>
             </a:r>
             <a:endParaRPr lang="de-DE" dirty="0"/>
+          </a:p>
+        </p:txBody>
+      </p:sp>
+      <p:sp>
+        <p:nvSpPr>
+          <p:cNvPr id="3" name="Inhaltsplatzhalter 2">
+            <a:extLst>
+              <a:ext uri="{FF2B5EF4-FFF2-40B4-BE49-F238E27FC236}">
+                <a16:creationId xmlns:a16="http://schemas.microsoft.com/office/drawing/2014/main" id="{6E16E57F-A9DA-49A7-B9A8-BBBF53D7A0DF}"/>
+              </a:ext>
+            </a:extLst>
+          </p:cNvPr>
+          <p:cNvSpPr>
+            <a:spLocks noGrp="1"/>
+          </p:cNvSpPr>
+          <p:nvPr>
+            <p:ph idx="1"/>
+          </p:nvPr>
+        </p:nvSpPr>
+        <p:spPr/>
+        <p:txBody>
+          <a:bodyPr/>
+          <a:lstStyle/>
+          <a:p>
+            <a:r>
+              <a:rPr lang="de-DE" dirty="0"/>
+              <a:t>769 Proteins </a:t>
+            </a:r>
+            <a:r>
+              <a:rPr lang="de-DE" dirty="0" err="1"/>
+              <a:t>from</a:t>
+            </a:r>
+            <a:r>
+              <a:rPr lang="de-DE" dirty="0"/>
+              <a:t> </a:t>
+            </a:r>
+            <a:r>
+              <a:rPr lang="de-DE" dirty="0" err="1"/>
+              <a:t>BioLip</a:t>
+            </a:r>
+            <a:endParaRPr lang="de-DE" dirty="0"/>
+          </a:p>
+          <a:p>
+            <a:pPr marL="0" indent="0">
+              <a:buNone/>
+            </a:pPr>
+            <a:r>
+              <a:rPr lang="de-DE" dirty="0">
+                <a:sym typeface="Wingdings" panose="05000000000000000000" pitchFamily="2" charset="2"/>
+              </a:rPr>
+              <a:t>	 117435 </a:t>
+            </a:r>
+            <a:r>
+              <a:rPr lang="de-DE" dirty="0" err="1">
+                <a:sym typeface="Wingdings" panose="05000000000000000000" pitchFamily="2" charset="2"/>
+              </a:rPr>
+              <a:t>residues</a:t>
+            </a:r>
+            <a:endParaRPr lang="de-DE" dirty="0"/>
+          </a:p>
+        </p:txBody>
+      </p:sp>
+      <p:sp>
+        <p:nvSpPr>
+          <p:cNvPr id="4" name="Foliennummernplatzhalter 3">
+            <a:extLst>
+              <a:ext uri="{FF2B5EF4-FFF2-40B4-BE49-F238E27FC236}">
+                <a16:creationId xmlns:a16="http://schemas.microsoft.com/office/drawing/2014/main" id="{2C191ED7-C3D1-467A-8E7C-75B24E1EF3C0}"/>
+              </a:ext>
+            </a:extLst>
+          </p:cNvPr>
+          <p:cNvSpPr>
+            <a:spLocks noGrp="1"/>
+          </p:cNvSpPr>
+          <p:nvPr>
+            <p:ph type="sldNum" sz="quarter" idx="12"/>
+          </p:nvPr>
+        </p:nvSpPr>
+        <p:spPr/>
+        <p:txBody>
+          <a:bodyPr/>
+          <a:lstStyle/>
+          <a:p>
+            <a:fld id="{CCAAE293-A3DA-4FFC-871C-7F0F209F7CB2}" type="slidenum">
+              <a:rPr lang="en-US" smtClean="0"/>
+              <a:t>10</a:t>
+            </a:fld>
+            <a:endParaRPr lang="en-US"/>
           </a:p>
         </p:txBody>
       </p:sp>
       <p:pic>
         <p:nvPicPr>
-          <p:cNvPr id="8" name="Inhaltsplatzhalter 7">
-            <a:extLst>
-              <a:ext uri="{FF2B5EF4-FFF2-40B4-BE49-F238E27FC236}">
-                <a16:creationId xmlns:a16="http://schemas.microsoft.com/office/drawing/2014/main" id="{DD13C4F1-21ED-4973-B770-7D5C0CD37A89}"/>
+          <p:cNvPr id="5" name="Grafik 4">
+            <a:extLst>
+              <a:ext uri="{FF2B5EF4-FFF2-40B4-BE49-F238E27FC236}">
+                <a16:creationId xmlns:a16="http://schemas.microsoft.com/office/drawing/2014/main" id="{8FC39B14-880B-40B2-89C6-D6556DA459BC}"/>
               </a:ext>
             </a:extLst>
           </p:cNvPr>
           <p:cNvPicPr>
-            <a:picLocks noGrp="1" noChangeAspect="1"/>
+            <a:picLocks noChangeAspect="1"/>
           </p:cNvPicPr>
-          <p:nvPr>
-            <p:ph sz="half" idx="1"/>
-          </p:nvPr>
+          <p:nvPr/>
         </p:nvPicPr>
         <p:blipFill>
           <a:blip r:embed="rId2"/>
@@ -4155,79 +4243,18 @@
         </p:blipFill>
         <p:spPr>
           <a:xfrm>
-            <a:off x="1249491" y="2053453"/>
-            <a:ext cx="4359018" cy="3895682"/>
+            <a:off x="6944452" y="2684477"/>
+            <a:ext cx="4776240" cy="3582180"/>
           </a:xfrm>
           <a:prstGeom prst="rect">
             <a:avLst/>
           </a:prstGeom>
         </p:spPr>
       </p:pic>
-      <p:pic>
-        <p:nvPicPr>
-          <p:cNvPr id="9" name="Inhaltsplatzhalter 8">
-            <a:extLst>
-              <a:ext uri="{FF2B5EF4-FFF2-40B4-BE49-F238E27FC236}">
-                <a16:creationId xmlns:a16="http://schemas.microsoft.com/office/drawing/2014/main" id="{D9478754-314A-47F3-8298-65235AA2C335}"/>
-              </a:ext>
-            </a:extLst>
-          </p:cNvPr>
-          <p:cNvPicPr>
-            <a:picLocks noGrp="1" noChangeAspect="1"/>
-          </p:cNvPicPr>
-          <p:nvPr>
-            <p:ph sz="half" idx="2"/>
-          </p:nvPr>
-        </p:nvPicPr>
-        <p:blipFill>
-          <a:blip r:embed="rId3"/>
-          <a:stretch>
-            <a:fillRect/>
-          </a:stretch>
-        </p:blipFill>
-        <p:spPr>
-          <a:xfrm>
-            <a:off x="6644456" y="2108322"/>
-            <a:ext cx="4237087" cy="3785944"/>
-          </a:xfrm>
-          <a:prstGeom prst="rect">
-            <a:avLst/>
-          </a:prstGeom>
-        </p:spPr>
-      </p:pic>
-      <p:sp>
-        <p:nvSpPr>
-          <p:cNvPr id="4" name="Foliennummernplatzhalter 3">
-            <a:extLst>
-              <a:ext uri="{FF2B5EF4-FFF2-40B4-BE49-F238E27FC236}">
-                <a16:creationId xmlns:a16="http://schemas.microsoft.com/office/drawing/2014/main" id="{41274183-5DF6-42AA-9AF2-97B73CC23AA2}"/>
-              </a:ext>
-            </a:extLst>
-          </p:cNvPr>
-          <p:cNvSpPr>
-            <a:spLocks noGrp="1"/>
-          </p:cNvSpPr>
-          <p:nvPr>
-            <p:ph type="sldNum" sz="quarter" idx="12"/>
-          </p:nvPr>
-        </p:nvSpPr>
-        <p:spPr/>
-        <p:txBody>
-          <a:bodyPr/>
-          <a:lstStyle/>
-          <a:p>
-            <a:fld id="{CCAAE293-A3DA-4FFC-871C-7F0F209F7CB2}" type="slidenum">
-              <a:rPr lang="en-US" smtClean="0"/>
-              <a:t>10</a:t>
-            </a:fld>
-            <a:endParaRPr lang="en-US"/>
-          </a:p>
-        </p:txBody>
-      </p:sp>
     </p:spTree>
     <p:extLst>
       <p:ext uri="{BB962C8B-B14F-4D97-AF65-F5344CB8AC3E}">
-        <p14:creationId xmlns:p14="http://schemas.microsoft.com/office/powerpoint/2010/main" val="1355063638"/>
+        <p14:creationId xmlns:p14="http://schemas.microsoft.com/office/powerpoint/2010/main" val="3608603696"/>
       </p:ext>
     </p:extLst>
   </p:cSld>
@@ -4259,7 +4286,7 @@
           <p:cNvPr id="2" name="Titel 1">
             <a:extLst>
               <a:ext uri="{FF2B5EF4-FFF2-40B4-BE49-F238E27FC236}">
-                <a16:creationId xmlns:a16="http://schemas.microsoft.com/office/drawing/2014/main" id="{5E3917E8-C5E2-4F20-AEFC-8A7FF8A5F443}"/>
+                <a16:creationId xmlns:a16="http://schemas.microsoft.com/office/drawing/2014/main" id="{90DA7BD1-7036-4062-A3E7-109EE85AC270}"/>
               </a:ext>
             </a:extLst>
           </p:cNvPr>
@@ -4278,22 +4305,127 @@
             <a:pPr algn="ctr"/>
             <a:r>
               <a:rPr lang="de-DE" dirty="0"/>
-              <a:t>Hyperparameter: Grid </a:t>
-            </a:r>
+              <a:t>Hyperparameter</a:t>
+            </a:r>
+            <a:endParaRPr lang="en-US" dirty="0"/>
+          </a:p>
+        </p:txBody>
+      </p:sp>
+      <p:sp>
+        <p:nvSpPr>
+          <p:cNvPr id="3" name="Inhaltsplatzhalter 2">
+            <a:extLst>
+              <a:ext uri="{FF2B5EF4-FFF2-40B4-BE49-F238E27FC236}">
+                <a16:creationId xmlns:a16="http://schemas.microsoft.com/office/drawing/2014/main" id="{08A62452-8D0B-487B-BF6E-8C680AB179B6}"/>
+              </a:ext>
+            </a:extLst>
+          </p:cNvPr>
+          <p:cNvSpPr>
+            <a:spLocks noGrp="1"/>
+          </p:cNvSpPr>
+          <p:nvPr>
+            <p:ph idx="1"/>
+          </p:nvPr>
+        </p:nvSpPr>
+        <p:spPr/>
+        <p:txBody>
+          <a:bodyPr>
+            <a:normAutofit fontScale="92500" lnSpcReduction="20000"/>
+          </a:bodyPr>
+          <a:lstStyle/>
+          <a:p>
             <a:r>
               <a:rPr lang="de-DE" dirty="0" err="1"/>
-              <a:t>search</a:t>
-            </a:r>
+              <a:t>Weigths</a:t>
+            </a:r>
+            <a:r>
+              <a:rPr lang="de-DE" dirty="0"/>
+              <a:t>: </a:t>
+            </a:r>
+          </a:p>
+          <a:p>
+            <a:pPr lvl="1"/>
+            <a:r>
+              <a:rPr lang="de-DE" dirty="0"/>
+              <a:t>Binding: 0.6</a:t>
+            </a:r>
+          </a:p>
+          <a:p>
+            <a:pPr lvl="1"/>
+            <a:r>
+              <a:rPr lang="de-DE" dirty="0"/>
+              <a:t>Non-</a:t>
+            </a:r>
+            <a:r>
+              <a:rPr lang="de-DE" dirty="0" err="1"/>
+              <a:t>binding</a:t>
+            </a:r>
+            <a:r>
+              <a:rPr lang="de-DE" dirty="0"/>
+              <a:t>: 0.4</a:t>
+            </a:r>
+          </a:p>
+          <a:p>
             <a:endParaRPr lang="de-DE" dirty="0"/>
           </a:p>
-        </p:txBody>
-      </p:sp>
-      <p:sp>
-        <p:nvSpPr>
-          <p:cNvPr id="5" name="Foliennummernplatzhalter 4">
-            <a:extLst>
-              <a:ext uri="{FF2B5EF4-FFF2-40B4-BE49-F238E27FC236}">
-                <a16:creationId xmlns:a16="http://schemas.microsoft.com/office/drawing/2014/main" id="{80A4DD8A-DF34-4E71-A690-0584852C452E}"/>
+          <a:p>
+            <a:r>
+              <a:rPr lang="de-DE" dirty="0"/>
+              <a:t>Learning rate: 0.003</a:t>
+            </a:r>
+          </a:p>
+          <a:p>
+            <a:endParaRPr lang="de-DE" dirty="0"/>
+          </a:p>
+          <a:p>
+            <a:r>
+              <a:rPr lang="de-DE" dirty="0" err="1"/>
+              <a:t>Prediction</a:t>
+            </a:r>
+            <a:r>
+              <a:rPr lang="de-DE" dirty="0"/>
+              <a:t> </a:t>
+            </a:r>
+            <a:r>
+              <a:rPr lang="de-DE" dirty="0" err="1"/>
+              <a:t>Cutoff</a:t>
+            </a:r>
+            <a:r>
+              <a:rPr lang="de-DE" dirty="0"/>
+              <a:t>: 0.4</a:t>
+            </a:r>
+          </a:p>
+          <a:p>
+            <a:endParaRPr lang="de-DE" dirty="0"/>
+          </a:p>
+          <a:p>
+            <a:r>
+              <a:rPr lang="de-DE" dirty="0"/>
+              <a:t>Momentum: 0.9</a:t>
+            </a:r>
+          </a:p>
+          <a:p>
+            <a:endParaRPr lang="de-DE" dirty="0"/>
+          </a:p>
+          <a:p>
+            <a:r>
+              <a:rPr lang="de-DE" dirty="0" err="1"/>
+              <a:t>Epochs</a:t>
+            </a:r>
+            <a:r>
+              <a:rPr lang="de-DE" dirty="0"/>
+              <a:t>: 200</a:t>
+            </a:r>
+            <a:endParaRPr lang="en-US" dirty="0"/>
+          </a:p>
+        </p:txBody>
+      </p:sp>
+      <p:sp>
+        <p:nvSpPr>
+          <p:cNvPr id="4" name="Foliennummernplatzhalter 3">
+            <a:extLst>
+              <a:ext uri="{FF2B5EF4-FFF2-40B4-BE49-F238E27FC236}">
+                <a16:creationId xmlns:a16="http://schemas.microsoft.com/office/drawing/2014/main" id="{5BC1D8A0-0EDC-4692-8350-8E5C893B0A2A}"/>
               </a:ext>
             </a:extLst>
           </p:cNvPr>
@@ -4312,6 +4444,256 @@
             <a:fld id="{CCAAE293-A3DA-4FFC-871C-7F0F209F7CB2}" type="slidenum">
               <a:rPr lang="en-US" smtClean="0"/>
               <a:t>11</a:t>
+            </a:fld>
+            <a:endParaRPr lang="en-US"/>
+          </a:p>
+        </p:txBody>
+      </p:sp>
+    </p:spTree>
+    <p:extLst>
+      <p:ext uri="{BB962C8B-B14F-4D97-AF65-F5344CB8AC3E}">
+        <p14:creationId xmlns:p14="http://schemas.microsoft.com/office/powerpoint/2010/main" val="3829208825"/>
+      </p:ext>
+    </p:extLst>
+  </p:cSld>
+  <p:clrMapOvr>
+    <a:masterClrMapping/>
+  </p:clrMapOvr>
+</p:sld>
+</file>
+
+<file path=ppt/slides/slide12.xml><?xml version="1.0" encoding="utf-8"?>
+<p:sld xmlns:a="http://schemas.openxmlformats.org/drawingml/2006/main" xmlns:r="http://schemas.openxmlformats.org/officeDocument/2006/relationships" xmlns:p="http://schemas.openxmlformats.org/presentationml/2006/main">
+  <p:cSld>
+    <p:spTree>
+      <p:nvGrpSpPr>
+        <p:cNvPr id="1" name=""/>
+        <p:cNvGrpSpPr/>
+        <p:nvPr/>
+      </p:nvGrpSpPr>
+      <p:grpSpPr>
+        <a:xfrm>
+          <a:off x="0" y="0"/>
+          <a:ext cx="0" cy="0"/>
+          <a:chOff x="0" y="0"/>
+          <a:chExt cx="0" cy="0"/>
+        </a:xfrm>
+      </p:grpSpPr>
+      <p:sp>
+        <p:nvSpPr>
+          <p:cNvPr id="5" name="Titel 4">
+            <a:extLst>
+              <a:ext uri="{FF2B5EF4-FFF2-40B4-BE49-F238E27FC236}">
+                <a16:creationId xmlns:a16="http://schemas.microsoft.com/office/drawing/2014/main" id="{ACFF07FE-4BFA-4138-9A63-E2152340D587}"/>
+              </a:ext>
+            </a:extLst>
+          </p:cNvPr>
+          <p:cNvSpPr>
+            <a:spLocks noGrp="1"/>
+          </p:cNvSpPr>
+          <p:nvPr>
+            <p:ph type="title"/>
+          </p:nvPr>
+        </p:nvSpPr>
+        <p:spPr/>
+        <p:txBody>
+          <a:bodyPr/>
+          <a:lstStyle/>
+          <a:p>
+            <a:pPr algn="ctr"/>
+            <a:r>
+              <a:rPr lang="de-DE" dirty="0"/>
+              <a:t>Hyperparameter: Grid </a:t>
+            </a:r>
+            <a:r>
+              <a:rPr lang="de-DE" dirty="0" err="1"/>
+              <a:t>search</a:t>
+            </a:r>
+            <a:endParaRPr lang="de-DE" dirty="0"/>
+          </a:p>
+        </p:txBody>
+      </p:sp>
+      <p:pic>
+        <p:nvPicPr>
+          <p:cNvPr id="8" name="Inhaltsplatzhalter 7">
+            <a:extLst>
+              <a:ext uri="{FF2B5EF4-FFF2-40B4-BE49-F238E27FC236}">
+                <a16:creationId xmlns:a16="http://schemas.microsoft.com/office/drawing/2014/main" id="{DD13C4F1-21ED-4973-B770-7D5C0CD37A89}"/>
+              </a:ext>
+            </a:extLst>
+          </p:cNvPr>
+          <p:cNvPicPr>
+            <a:picLocks noGrp="1" noChangeAspect="1"/>
+          </p:cNvPicPr>
+          <p:nvPr>
+            <p:ph sz="half" idx="1"/>
+          </p:nvPr>
+        </p:nvPicPr>
+        <p:blipFill>
+          <a:blip r:embed="rId2"/>
+          <a:stretch>
+            <a:fillRect/>
+          </a:stretch>
+        </p:blipFill>
+        <p:spPr>
+          <a:xfrm>
+            <a:off x="1249491" y="2053453"/>
+            <a:ext cx="4359018" cy="3895682"/>
+          </a:xfrm>
+          <a:prstGeom prst="rect">
+            <a:avLst/>
+          </a:prstGeom>
+        </p:spPr>
+      </p:pic>
+      <p:pic>
+        <p:nvPicPr>
+          <p:cNvPr id="9" name="Inhaltsplatzhalter 8">
+            <a:extLst>
+              <a:ext uri="{FF2B5EF4-FFF2-40B4-BE49-F238E27FC236}">
+                <a16:creationId xmlns:a16="http://schemas.microsoft.com/office/drawing/2014/main" id="{D9478754-314A-47F3-8298-65235AA2C335}"/>
+              </a:ext>
+            </a:extLst>
+          </p:cNvPr>
+          <p:cNvPicPr>
+            <a:picLocks noGrp="1" noChangeAspect="1"/>
+          </p:cNvPicPr>
+          <p:nvPr>
+            <p:ph sz="half" idx="2"/>
+          </p:nvPr>
+        </p:nvPicPr>
+        <p:blipFill>
+          <a:blip r:embed="rId3"/>
+          <a:stretch>
+            <a:fillRect/>
+          </a:stretch>
+        </p:blipFill>
+        <p:spPr>
+          <a:xfrm>
+            <a:off x="6644456" y="2108322"/>
+            <a:ext cx="4237087" cy="3785944"/>
+          </a:xfrm>
+          <a:prstGeom prst="rect">
+            <a:avLst/>
+          </a:prstGeom>
+        </p:spPr>
+      </p:pic>
+      <p:sp>
+        <p:nvSpPr>
+          <p:cNvPr id="4" name="Foliennummernplatzhalter 3">
+            <a:extLst>
+              <a:ext uri="{FF2B5EF4-FFF2-40B4-BE49-F238E27FC236}">
+                <a16:creationId xmlns:a16="http://schemas.microsoft.com/office/drawing/2014/main" id="{41274183-5DF6-42AA-9AF2-97B73CC23AA2}"/>
+              </a:ext>
+            </a:extLst>
+          </p:cNvPr>
+          <p:cNvSpPr>
+            <a:spLocks noGrp="1"/>
+          </p:cNvSpPr>
+          <p:nvPr>
+            <p:ph type="sldNum" sz="quarter" idx="12"/>
+          </p:nvPr>
+        </p:nvSpPr>
+        <p:spPr/>
+        <p:txBody>
+          <a:bodyPr/>
+          <a:lstStyle/>
+          <a:p>
+            <a:fld id="{CCAAE293-A3DA-4FFC-871C-7F0F209F7CB2}" type="slidenum">
+              <a:rPr lang="en-US" smtClean="0"/>
+              <a:t>12</a:t>
+            </a:fld>
+            <a:endParaRPr lang="en-US"/>
+          </a:p>
+        </p:txBody>
+      </p:sp>
+    </p:spTree>
+    <p:extLst>
+      <p:ext uri="{BB962C8B-B14F-4D97-AF65-F5344CB8AC3E}">
+        <p14:creationId xmlns:p14="http://schemas.microsoft.com/office/powerpoint/2010/main" val="1355063638"/>
+      </p:ext>
+    </p:extLst>
+  </p:cSld>
+  <p:clrMapOvr>
+    <a:masterClrMapping/>
+  </p:clrMapOvr>
+</p:sld>
+</file>
+
+<file path=ppt/slides/slide13.xml><?xml version="1.0" encoding="utf-8"?>
+<p:sld xmlns:a="http://schemas.openxmlformats.org/drawingml/2006/main" xmlns:r="http://schemas.openxmlformats.org/officeDocument/2006/relationships" xmlns:p="http://schemas.openxmlformats.org/presentationml/2006/main">
+  <p:cSld>
+    <p:spTree>
+      <p:nvGrpSpPr>
+        <p:cNvPr id="1" name=""/>
+        <p:cNvGrpSpPr/>
+        <p:nvPr/>
+      </p:nvGrpSpPr>
+      <p:grpSpPr>
+        <a:xfrm>
+          <a:off x="0" y="0"/>
+          <a:ext cx="0" cy="0"/>
+          <a:chOff x="0" y="0"/>
+          <a:chExt cx="0" cy="0"/>
+        </a:xfrm>
+      </p:grpSpPr>
+      <p:sp>
+        <p:nvSpPr>
+          <p:cNvPr id="2" name="Titel 1">
+            <a:extLst>
+              <a:ext uri="{FF2B5EF4-FFF2-40B4-BE49-F238E27FC236}">
+                <a16:creationId xmlns:a16="http://schemas.microsoft.com/office/drawing/2014/main" id="{5E3917E8-C5E2-4F20-AEFC-8A7FF8A5F443}"/>
+              </a:ext>
+            </a:extLst>
+          </p:cNvPr>
+          <p:cNvSpPr>
+            <a:spLocks noGrp="1"/>
+          </p:cNvSpPr>
+          <p:nvPr>
+            <p:ph type="title"/>
+          </p:nvPr>
+        </p:nvSpPr>
+        <p:spPr/>
+        <p:txBody>
+          <a:bodyPr/>
+          <a:lstStyle/>
+          <a:p>
+            <a:pPr algn="ctr"/>
+            <a:r>
+              <a:rPr lang="de-DE" dirty="0"/>
+              <a:t>Hyperparameter: Grid </a:t>
+            </a:r>
+            <a:r>
+              <a:rPr lang="de-DE" dirty="0" err="1"/>
+              <a:t>search</a:t>
+            </a:r>
+            <a:endParaRPr lang="de-DE" dirty="0"/>
+          </a:p>
+        </p:txBody>
+      </p:sp>
+      <p:sp>
+        <p:nvSpPr>
+          <p:cNvPr id="5" name="Foliennummernplatzhalter 4">
+            <a:extLst>
+              <a:ext uri="{FF2B5EF4-FFF2-40B4-BE49-F238E27FC236}">
+                <a16:creationId xmlns:a16="http://schemas.microsoft.com/office/drawing/2014/main" id="{80A4DD8A-DF34-4E71-A690-0584852C452E}"/>
+              </a:ext>
+            </a:extLst>
+          </p:cNvPr>
+          <p:cNvSpPr>
+            <a:spLocks noGrp="1"/>
+          </p:cNvSpPr>
+          <p:nvPr>
+            <p:ph type="sldNum" sz="quarter" idx="12"/>
+          </p:nvPr>
+        </p:nvSpPr>
+        <p:spPr/>
+        <p:txBody>
+          <a:bodyPr/>
+          <a:lstStyle/>
+          <a:p>
+            <a:fld id="{CCAAE293-A3DA-4FFC-871C-7F0F209F7CB2}" type="slidenum">
+              <a:rPr lang="en-US" smtClean="0"/>
+              <a:t>13</a:t>
             </a:fld>
             <a:endParaRPr lang="en-US"/>
           </a:p>
@@ -4400,7 +4782,7 @@
 </p:sld>
 </file>
 
-<file path=ppt/slides/slide12.xml><?xml version="1.0" encoding="utf-8"?>
+<file path=ppt/slides/slide14.xml><?xml version="1.0" encoding="utf-8"?>
 <p:sld xmlns:a="http://schemas.openxmlformats.org/drawingml/2006/main" xmlns:r="http://schemas.openxmlformats.org/officeDocument/2006/relationships" xmlns:p="http://schemas.openxmlformats.org/presentationml/2006/main">
   <p:cSld>
     <p:spTree>
@@ -4474,7 +4856,7 @@
           <a:p>
             <a:fld id="{CCAAE293-A3DA-4FFC-871C-7F0F209F7CB2}" type="slidenum">
               <a:rPr lang="en-US" smtClean="0"/>
-              <a:t>12</a:t>
+              <a:t>14</a:t>
             </a:fld>
             <a:endParaRPr lang="en-US"/>
           </a:p>
@@ -4563,7 +4945,7 @@
 </p:sld>
 </file>
 
-<file path=ppt/slides/slide13.xml><?xml version="1.0" encoding="utf-8"?>
+<file path=ppt/slides/slide15.xml><?xml version="1.0" encoding="utf-8"?>
 <p:sld xmlns:a="http://schemas.openxmlformats.org/drawingml/2006/main" xmlns:r="http://schemas.openxmlformats.org/officeDocument/2006/relationships" xmlns:p="http://schemas.openxmlformats.org/presentationml/2006/main">
   <p:cSld>
     <p:spTree>
@@ -4637,7 +5019,7 @@
           <a:p>
             <a:fld id="{CCAAE293-A3DA-4FFC-871C-7F0F209F7CB2}" type="slidenum">
               <a:rPr lang="en-US" smtClean="0"/>
-              <a:t>13</a:t>
+              <a:t>15</a:t>
             </a:fld>
             <a:endParaRPr lang="en-US"/>
           </a:p>
@@ -4691,7 +5073,7 @@
 </p:sld>
 </file>
 
-<file path=ppt/slides/slide14.xml><?xml version="1.0" encoding="utf-8"?>
+<file path=ppt/slides/slide16.xml><?xml version="1.0" encoding="utf-8"?>
 <p:sld xmlns:a="http://schemas.openxmlformats.org/drawingml/2006/main" xmlns:r="http://schemas.openxmlformats.org/officeDocument/2006/relationships" xmlns:p="http://schemas.openxmlformats.org/presentationml/2006/main">
   <p:cSld>
     <p:spTree>
@@ -4803,7 +5185,7 @@
           <a:p>
             <a:fld id="{CCAAE293-A3DA-4FFC-871C-7F0F209F7CB2}" type="slidenum">
               <a:rPr lang="en-US" smtClean="0"/>
-              <a:t>14</a:t>
+              <a:t>16</a:t>
             </a:fld>
             <a:endParaRPr lang="en-US"/>
           </a:p>
@@ -4998,7 +5380,7 @@
             <a:pPr algn="ctr"/>
             <a:r>
               <a:rPr lang="en-US" dirty="0"/>
-              <a:t>MCC: 0.24 ± 0.05</a:t>
+              <a:t>MCC: 0.24 ± 0.01</a:t>
             </a:r>
           </a:p>
           <a:p>
@@ -5009,7 +5391,7 @@
             <a:pPr algn="ctr"/>
             <a:r>
               <a:rPr lang="en-US" dirty="0"/>
-              <a:t>F1-score:	0.24 ± 0.05</a:t>
+              <a:t>F1-score:	0.24 ± 0.01</a:t>
             </a:r>
           </a:p>
           <a:p>
@@ -5031,7 +5413,7 @@
 </p:sld>
 </file>
 
-<file path=ppt/slides/slide15.xml><?xml version="1.0" encoding="utf-8"?>
+<file path=ppt/slides/slide17.xml><?xml version="1.0" encoding="utf-8"?>
 <p:sld xmlns:a="http://schemas.openxmlformats.org/drawingml/2006/main" xmlns:r="http://schemas.openxmlformats.org/officeDocument/2006/relationships" xmlns:p="http://schemas.openxmlformats.org/presentationml/2006/main">
   <p:cSld>
     <p:spTree>
@@ -5444,7 +5826,7 @@
           <a:p>
             <a:fld id="{CCAAE293-A3DA-4FFC-871C-7F0F209F7CB2}" type="slidenum">
               <a:rPr lang="en-US" smtClean="0"/>
-              <a:t>15</a:t>
+              <a:t>17</a:t>
             </a:fld>
             <a:endParaRPr lang="en-US"/>
           </a:p>
@@ -5463,7 +5845,7 @@
 </p:sld>
 </file>
 
-<file path=ppt/slides/slide16.xml><?xml version="1.0" encoding="utf-8"?>
+<file path=ppt/slides/slide18.xml><?xml version="1.0" encoding="utf-8"?>
 <p:sld xmlns:a="http://schemas.openxmlformats.org/drawingml/2006/main" xmlns:r="http://schemas.openxmlformats.org/officeDocument/2006/relationships" xmlns:p="http://schemas.openxmlformats.org/presentationml/2006/main">
   <p:cSld>
     <p:spTree>
@@ -5558,7 +5940,7 @@
           <a:p>
             <a:fld id="{CCAAE293-A3DA-4FFC-871C-7F0F209F7CB2}" type="slidenum">
               <a:rPr lang="en-US" smtClean="0"/>
-              <a:t>16</a:t>
+              <a:t>18</a:t>
             </a:fld>
             <a:endParaRPr lang="en-US"/>
           </a:p>
@@ -6063,7 +6445,7 @@
 </p:sld>
 </file>
 
-<file path=ppt/slides/slide17.xml><?xml version="1.0" encoding="utf-8"?>
+<file path=ppt/slides/slide19.xml><?xml version="1.0" encoding="utf-8"?>
 <p:sld xmlns:a="http://schemas.openxmlformats.org/drawingml/2006/main" xmlns:r="http://schemas.openxmlformats.org/officeDocument/2006/relationships" xmlns:p="http://schemas.openxmlformats.org/presentationml/2006/main">
   <p:cSld>
     <p:spTree>
@@ -6143,7 +6525,7 @@
           <a:p>
             <a:fld id="{CCAAE293-A3DA-4FFC-871C-7F0F209F7CB2}" type="slidenum">
               <a:rPr lang="en-US" smtClean="0"/>
-              <a:t>17</a:t>
+              <a:t>19</a:t>
             </a:fld>
             <a:endParaRPr lang="en-US"/>
           </a:p>
@@ -6199,7 +6581,7 @@
 </p:sld>
 </file>
 
-<file path=ppt/slides/slide18.xml><?xml version="1.0" encoding="utf-8"?>
+<file path=ppt/slides/slide2.xml><?xml version="1.0" encoding="utf-8"?>
 <p:sld xmlns:a="http://schemas.openxmlformats.org/drawingml/2006/main" xmlns:r="http://schemas.openxmlformats.org/officeDocument/2006/relationships" xmlns:p="http://schemas.openxmlformats.org/presentationml/2006/main">
   <p:cSld>
     <p:spTree>
@@ -6218,10 +6600,97 @@
       </p:grpSpPr>
       <p:sp>
         <p:nvSpPr>
+          <p:cNvPr id="2" name="Titel 1">
+            <a:extLst>
+              <a:ext uri="{FF2B5EF4-FFF2-40B4-BE49-F238E27FC236}">
+                <a16:creationId xmlns:a16="http://schemas.microsoft.com/office/drawing/2014/main" id="{F9CD20AA-91B5-4158-923D-AF0E8C740F43}"/>
+              </a:ext>
+            </a:extLst>
+          </p:cNvPr>
+          <p:cNvSpPr>
+            <a:spLocks noGrp="1"/>
+          </p:cNvSpPr>
+          <p:nvPr>
+            <p:ph type="title"/>
+          </p:nvPr>
+        </p:nvSpPr>
+        <p:spPr/>
+        <p:txBody>
+          <a:bodyPr/>
+          <a:lstStyle/>
+          <a:p>
+            <a:pPr algn="ctr"/>
+            <a:r>
+              <a:rPr lang="de-DE" dirty="0"/>
+              <a:t>Outline</a:t>
+            </a:r>
+          </a:p>
+        </p:txBody>
+      </p:sp>
+      <p:sp>
+        <p:nvSpPr>
+          <p:cNvPr id="3" name="Inhaltsplatzhalter 2">
+            <a:extLst>
+              <a:ext uri="{FF2B5EF4-FFF2-40B4-BE49-F238E27FC236}">
+                <a16:creationId xmlns:a16="http://schemas.microsoft.com/office/drawing/2014/main" id="{34D02058-2A45-4C57-9888-15A9F46BB3A6}"/>
+              </a:ext>
+            </a:extLst>
+          </p:cNvPr>
+          <p:cNvSpPr>
+            <a:spLocks noGrp="1"/>
+          </p:cNvSpPr>
+          <p:nvPr>
+            <p:ph idx="1"/>
+          </p:nvPr>
+        </p:nvSpPr>
+        <p:spPr/>
+        <p:txBody>
+          <a:bodyPr/>
+          <a:lstStyle/>
+          <a:p>
+            <a:r>
+              <a:rPr lang="de-DE" dirty="0"/>
+              <a:t>Feature</a:t>
+            </a:r>
+          </a:p>
+          <a:p>
+            <a:endParaRPr lang="de-DE" dirty="0"/>
+          </a:p>
+          <a:p>
+            <a:r>
+              <a:rPr lang="de-DE" dirty="0" err="1"/>
+              <a:t>Algorithm</a:t>
+            </a:r>
+            <a:r>
+              <a:rPr lang="de-DE" dirty="0"/>
+              <a:t> </a:t>
+            </a:r>
+            <a:r>
+              <a:rPr lang="de-DE" dirty="0" err="1"/>
+              <a:t>structure</a:t>
+            </a:r>
+            <a:r>
+              <a:rPr lang="de-DE" dirty="0"/>
+              <a:t> and Hyperparameters</a:t>
+            </a:r>
+          </a:p>
+          <a:p>
+            <a:endParaRPr lang="de-DE" dirty="0"/>
+          </a:p>
+          <a:p>
+            <a:r>
+              <a:rPr lang="de-DE" dirty="0"/>
+              <a:t> Performance</a:t>
+            </a:r>
+          </a:p>
+        </p:txBody>
+      </p:sp>
+      <p:sp>
+        <p:nvSpPr>
           <p:cNvPr id="4" name="Foliennummernplatzhalter 3">
             <a:extLst>
               <a:ext uri="{FF2B5EF4-FFF2-40B4-BE49-F238E27FC236}">
-                <a16:creationId xmlns:a16="http://schemas.microsoft.com/office/drawing/2014/main" id="{768EA576-5302-4115-88A4-24E38051F977}"/>
+                <a16:creationId xmlns:a16="http://schemas.microsoft.com/office/drawing/2014/main" id="{C40F9798-9367-4AE8-91DF-E1FE6C05B5A7}"/>
               </a:ext>
             </a:extLst>
           </p:cNvPr>
@@ -6239,7 +6708,66 @@
           <a:p>
             <a:fld id="{CCAAE293-A3DA-4FFC-871C-7F0F209F7CB2}" type="slidenum">
               <a:rPr lang="en-US" smtClean="0"/>
-              <a:t>18</a:t>
+              <a:t>2</a:t>
+            </a:fld>
+            <a:endParaRPr lang="en-US"/>
+          </a:p>
+        </p:txBody>
+      </p:sp>
+    </p:spTree>
+    <p:extLst>
+      <p:ext uri="{BB962C8B-B14F-4D97-AF65-F5344CB8AC3E}">
+        <p14:creationId xmlns:p14="http://schemas.microsoft.com/office/powerpoint/2010/main" val="3125192918"/>
+      </p:ext>
+    </p:extLst>
+  </p:cSld>
+  <p:clrMapOvr>
+    <a:masterClrMapping/>
+  </p:clrMapOvr>
+</p:sld>
+</file>
+
+<file path=ppt/slides/slide20.xml><?xml version="1.0" encoding="utf-8"?>
+<p:sld xmlns:a="http://schemas.openxmlformats.org/drawingml/2006/main" xmlns:r="http://schemas.openxmlformats.org/officeDocument/2006/relationships" xmlns:p="http://schemas.openxmlformats.org/presentationml/2006/main">
+  <p:cSld>
+    <p:spTree>
+      <p:nvGrpSpPr>
+        <p:cNvPr id="1" name=""/>
+        <p:cNvGrpSpPr/>
+        <p:nvPr/>
+      </p:nvGrpSpPr>
+      <p:grpSpPr>
+        <a:xfrm>
+          <a:off x="0" y="0"/>
+          <a:ext cx="0" cy="0"/>
+          <a:chOff x="0" y="0"/>
+          <a:chExt cx="0" cy="0"/>
+        </a:xfrm>
+      </p:grpSpPr>
+      <p:sp>
+        <p:nvSpPr>
+          <p:cNvPr id="4" name="Foliennummernplatzhalter 3">
+            <a:extLst>
+              <a:ext uri="{FF2B5EF4-FFF2-40B4-BE49-F238E27FC236}">
+                <a16:creationId xmlns:a16="http://schemas.microsoft.com/office/drawing/2014/main" id="{768EA576-5302-4115-88A4-24E38051F977}"/>
+              </a:ext>
+            </a:extLst>
+          </p:cNvPr>
+          <p:cNvSpPr>
+            <a:spLocks noGrp="1"/>
+          </p:cNvSpPr>
+          <p:nvPr>
+            <p:ph type="sldNum" sz="quarter" idx="12"/>
+          </p:nvPr>
+        </p:nvSpPr>
+        <p:spPr/>
+        <p:txBody>
+          <a:bodyPr/>
+          <a:lstStyle/>
+          <a:p>
+            <a:fld id="{CCAAE293-A3DA-4FFC-871C-7F0F209F7CB2}" type="slidenum">
+              <a:rPr lang="en-US" smtClean="0"/>
+              <a:t>20</a:t>
             </a:fld>
             <a:endParaRPr lang="en-US"/>
           </a:p>
@@ -6345,7 +6873,7 @@
 </p:sld>
 </file>
 
-<file path=ppt/slides/slide19.xml><?xml version="1.0" encoding="utf-8"?>
+<file path=ppt/slides/slide21.xml><?xml version="1.0" encoding="utf-8"?>
 <p:sld xmlns:a="http://schemas.openxmlformats.org/drawingml/2006/main" xmlns:r="http://schemas.openxmlformats.org/officeDocument/2006/relationships" xmlns:p="http://schemas.openxmlformats.org/presentationml/2006/main">
   <p:cSld>
     <p:spTree>
@@ -6464,7 +6992,7 @@
           <a:p>
             <a:fld id="{CCAAE293-A3DA-4FFC-871C-7F0F209F7CB2}" type="slidenum">
               <a:rPr lang="en-US" smtClean="0"/>
-              <a:t>19</a:t>
+              <a:t>21</a:t>
             </a:fld>
             <a:endParaRPr lang="en-US"/>
           </a:p>
@@ -6519,463 +7047,6 @@
 </p:sld>
 </file>
 
-<file path=ppt/slides/slide2.xml><?xml version="1.0" encoding="utf-8"?>
-<p:sld xmlns:a="http://schemas.openxmlformats.org/drawingml/2006/main" xmlns:r="http://schemas.openxmlformats.org/officeDocument/2006/relationships" xmlns:p="http://schemas.openxmlformats.org/presentationml/2006/main">
-  <p:cSld>
-    <p:spTree>
-      <p:nvGrpSpPr>
-        <p:cNvPr id="1" name=""/>
-        <p:cNvGrpSpPr/>
-        <p:nvPr/>
-      </p:nvGrpSpPr>
-      <p:grpSpPr>
-        <a:xfrm>
-          <a:off x="0" y="0"/>
-          <a:ext cx="0" cy="0"/>
-          <a:chOff x="0" y="0"/>
-          <a:chExt cx="0" cy="0"/>
-        </a:xfrm>
-      </p:grpSpPr>
-      <p:sp>
-        <p:nvSpPr>
-          <p:cNvPr id="2" name="Titel 1">
-            <a:extLst>
-              <a:ext uri="{FF2B5EF4-FFF2-40B4-BE49-F238E27FC236}">
-                <a16:creationId xmlns:a16="http://schemas.microsoft.com/office/drawing/2014/main" id="{F9CD20AA-91B5-4158-923D-AF0E8C740F43}"/>
-              </a:ext>
-            </a:extLst>
-          </p:cNvPr>
-          <p:cNvSpPr>
-            <a:spLocks noGrp="1"/>
-          </p:cNvSpPr>
-          <p:nvPr>
-            <p:ph type="title"/>
-          </p:nvPr>
-        </p:nvSpPr>
-        <p:spPr/>
-        <p:txBody>
-          <a:bodyPr/>
-          <a:lstStyle/>
-          <a:p>
-            <a:pPr algn="ctr"/>
-            <a:r>
-              <a:rPr lang="de-DE" dirty="0" err="1"/>
-              <a:t>Outlay</a:t>
-            </a:r>
-            <a:endParaRPr lang="de-DE" dirty="0"/>
-          </a:p>
-        </p:txBody>
-      </p:sp>
-      <p:sp>
-        <p:nvSpPr>
-          <p:cNvPr id="3" name="Inhaltsplatzhalter 2">
-            <a:extLst>
-              <a:ext uri="{FF2B5EF4-FFF2-40B4-BE49-F238E27FC236}">
-                <a16:creationId xmlns:a16="http://schemas.microsoft.com/office/drawing/2014/main" id="{34D02058-2A45-4C57-9888-15A9F46BB3A6}"/>
-              </a:ext>
-            </a:extLst>
-          </p:cNvPr>
-          <p:cNvSpPr>
-            <a:spLocks noGrp="1"/>
-          </p:cNvSpPr>
-          <p:nvPr>
-            <p:ph idx="1"/>
-          </p:nvPr>
-        </p:nvSpPr>
-        <p:spPr/>
-        <p:txBody>
-          <a:bodyPr/>
-          <a:lstStyle/>
-          <a:p>
-            <a:r>
-              <a:rPr lang="de-DE" dirty="0"/>
-              <a:t>Feature</a:t>
-            </a:r>
-          </a:p>
-          <a:p>
-            <a:endParaRPr lang="de-DE" dirty="0"/>
-          </a:p>
-          <a:p>
-            <a:r>
-              <a:rPr lang="de-DE" dirty="0" err="1"/>
-              <a:t>Algorithm</a:t>
-            </a:r>
-            <a:r>
-              <a:rPr lang="de-DE" dirty="0"/>
-              <a:t> </a:t>
-            </a:r>
-            <a:r>
-              <a:rPr lang="de-DE" dirty="0" err="1"/>
-              <a:t>structure</a:t>
-            </a:r>
-            <a:r>
-              <a:rPr lang="de-DE" dirty="0"/>
-              <a:t> and Hyperparameters</a:t>
-            </a:r>
-          </a:p>
-          <a:p>
-            <a:endParaRPr lang="de-DE" dirty="0"/>
-          </a:p>
-          <a:p>
-            <a:r>
-              <a:rPr lang="de-DE" dirty="0"/>
-              <a:t> Performance</a:t>
-            </a:r>
-          </a:p>
-        </p:txBody>
-      </p:sp>
-      <p:sp>
-        <p:nvSpPr>
-          <p:cNvPr id="4" name="Foliennummernplatzhalter 3">
-            <a:extLst>
-              <a:ext uri="{FF2B5EF4-FFF2-40B4-BE49-F238E27FC236}">
-                <a16:creationId xmlns:a16="http://schemas.microsoft.com/office/drawing/2014/main" id="{C40F9798-9367-4AE8-91DF-E1FE6C05B5A7}"/>
-              </a:ext>
-            </a:extLst>
-          </p:cNvPr>
-          <p:cNvSpPr>
-            <a:spLocks noGrp="1"/>
-          </p:cNvSpPr>
-          <p:nvPr>
-            <p:ph type="sldNum" sz="quarter" idx="12"/>
-          </p:nvPr>
-        </p:nvSpPr>
-        <p:spPr/>
-        <p:txBody>
-          <a:bodyPr/>
-          <a:lstStyle/>
-          <a:p>
-            <a:fld id="{CCAAE293-A3DA-4FFC-871C-7F0F209F7CB2}" type="slidenum">
-              <a:rPr lang="en-US" smtClean="0"/>
-              <a:t>2</a:t>
-            </a:fld>
-            <a:endParaRPr lang="en-US"/>
-          </a:p>
-        </p:txBody>
-      </p:sp>
-    </p:spTree>
-    <p:extLst>
-      <p:ext uri="{BB962C8B-B14F-4D97-AF65-F5344CB8AC3E}">
-        <p14:creationId xmlns:p14="http://schemas.microsoft.com/office/powerpoint/2010/main" val="3125192918"/>
-      </p:ext>
-    </p:extLst>
-  </p:cSld>
-  <p:clrMapOvr>
-    <a:masterClrMapping/>
-  </p:clrMapOvr>
-</p:sld>
-</file>
-
-<file path=ppt/slides/slide20.xml><?xml version="1.0" encoding="utf-8"?>
-<p:sld xmlns:a="http://schemas.openxmlformats.org/drawingml/2006/main" xmlns:r="http://schemas.openxmlformats.org/officeDocument/2006/relationships" xmlns:p="http://schemas.openxmlformats.org/presentationml/2006/main">
-  <p:cSld>
-    <p:spTree>
-      <p:nvGrpSpPr>
-        <p:cNvPr id="1" name=""/>
-        <p:cNvGrpSpPr/>
-        <p:nvPr/>
-      </p:nvGrpSpPr>
-      <p:grpSpPr>
-        <a:xfrm>
-          <a:off x="0" y="0"/>
-          <a:ext cx="0" cy="0"/>
-          <a:chOff x="0" y="0"/>
-          <a:chExt cx="0" cy="0"/>
-        </a:xfrm>
-      </p:grpSpPr>
-      <p:sp>
-        <p:nvSpPr>
-          <p:cNvPr id="2" name="Titel 1">
-            <a:extLst>
-              <a:ext uri="{FF2B5EF4-FFF2-40B4-BE49-F238E27FC236}">
-                <a16:creationId xmlns:a16="http://schemas.microsoft.com/office/drawing/2014/main" id="{0A1CFA08-33E9-4E06-B481-DDF49C7CE225}"/>
-              </a:ext>
-            </a:extLst>
-          </p:cNvPr>
-          <p:cNvSpPr>
-            <a:spLocks noGrp="1"/>
-          </p:cNvSpPr>
-          <p:nvPr>
-            <p:ph type="title"/>
-          </p:nvPr>
-        </p:nvSpPr>
-        <p:spPr/>
-        <p:txBody>
-          <a:bodyPr/>
-          <a:lstStyle/>
-          <a:p>
-            <a:pPr algn="ctr"/>
-            <a:r>
-              <a:rPr lang="de-DE" dirty="0" err="1"/>
-              <a:t>Thank</a:t>
-            </a:r>
-            <a:r>
-              <a:rPr lang="de-DE" dirty="0"/>
-              <a:t> </a:t>
-            </a:r>
-            <a:r>
-              <a:rPr lang="de-DE" dirty="0" err="1"/>
-              <a:t>you</a:t>
-            </a:r>
-            <a:r>
-              <a:rPr lang="de-DE" dirty="0"/>
-              <a:t>!</a:t>
-            </a:r>
-          </a:p>
-        </p:txBody>
-      </p:sp>
-      <p:sp>
-        <p:nvSpPr>
-          <p:cNvPr id="3" name="Inhaltsplatzhalter 2">
-            <a:extLst>
-              <a:ext uri="{FF2B5EF4-FFF2-40B4-BE49-F238E27FC236}">
-                <a16:creationId xmlns:a16="http://schemas.microsoft.com/office/drawing/2014/main" id="{D1ED0091-A0CC-4522-A4E1-99602C92F687}"/>
-              </a:ext>
-            </a:extLst>
-          </p:cNvPr>
-          <p:cNvSpPr>
-            <a:spLocks noGrp="1"/>
-          </p:cNvSpPr>
-          <p:nvPr>
-            <p:ph idx="1"/>
-          </p:nvPr>
-        </p:nvSpPr>
-        <p:spPr/>
-        <p:txBody>
-          <a:bodyPr>
-            <a:normAutofit/>
-          </a:bodyPr>
-          <a:lstStyle/>
-          <a:p>
-            <a:pPr marL="0" indent="0" algn="ctr">
-              <a:buNone/>
-            </a:pPr>
-            <a:endParaRPr lang="de-DE" sz="3600" dirty="0"/>
-          </a:p>
-          <a:p>
-            <a:pPr marL="0" indent="0" algn="ctr">
-              <a:buNone/>
-            </a:pPr>
-            <a:endParaRPr lang="de-DE" sz="3600" dirty="0"/>
-          </a:p>
-          <a:p>
-            <a:pPr marL="0" indent="0" algn="ctr">
-              <a:buNone/>
-            </a:pPr>
-            <a:r>
-              <a:rPr lang="de-DE" sz="3600" dirty="0"/>
-              <a:t>Questions?</a:t>
-            </a:r>
-          </a:p>
-        </p:txBody>
-      </p:sp>
-      <p:sp>
-        <p:nvSpPr>
-          <p:cNvPr id="4" name="Foliennummernplatzhalter 3">
-            <a:extLst>
-              <a:ext uri="{FF2B5EF4-FFF2-40B4-BE49-F238E27FC236}">
-                <a16:creationId xmlns:a16="http://schemas.microsoft.com/office/drawing/2014/main" id="{6FE2A71F-4FFC-484B-93E3-04D170029A13}"/>
-              </a:ext>
-            </a:extLst>
-          </p:cNvPr>
-          <p:cNvSpPr>
-            <a:spLocks noGrp="1"/>
-          </p:cNvSpPr>
-          <p:nvPr>
-            <p:ph type="sldNum" sz="quarter" idx="12"/>
-          </p:nvPr>
-        </p:nvSpPr>
-        <p:spPr/>
-        <p:txBody>
-          <a:bodyPr/>
-          <a:lstStyle/>
-          <a:p>
-            <a:fld id="{CCAAE293-A3DA-4FFC-871C-7F0F209F7CB2}" type="slidenum">
-              <a:rPr lang="en-US" smtClean="0"/>
-              <a:t>20</a:t>
-            </a:fld>
-            <a:endParaRPr lang="en-US"/>
-          </a:p>
-        </p:txBody>
-      </p:sp>
-    </p:spTree>
-    <p:extLst>
-      <p:ext uri="{BB962C8B-B14F-4D97-AF65-F5344CB8AC3E}">
-        <p14:creationId xmlns:p14="http://schemas.microsoft.com/office/powerpoint/2010/main" val="1520254085"/>
-      </p:ext>
-    </p:extLst>
-  </p:cSld>
-  <p:clrMapOvr>
-    <a:masterClrMapping/>
-  </p:clrMapOvr>
-</p:sld>
-</file>
-
-<file path=ppt/slides/slide21.xml><?xml version="1.0" encoding="utf-8"?>
-<p:sld xmlns:a="http://schemas.openxmlformats.org/drawingml/2006/main" xmlns:r="http://schemas.openxmlformats.org/officeDocument/2006/relationships" xmlns:p="http://schemas.openxmlformats.org/presentationml/2006/main">
-  <p:cSld>
-    <p:spTree>
-      <p:nvGrpSpPr>
-        <p:cNvPr id="1" name=""/>
-        <p:cNvGrpSpPr/>
-        <p:nvPr/>
-      </p:nvGrpSpPr>
-      <p:grpSpPr>
-        <a:xfrm>
-          <a:off x="0" y="0"/>
-          <a:ext cx="0" cy="0"/>
-          <a:chOff x="0" y="0"/>
-          <a:chExt cx="0" cy="0"/>
-        </a:xfrm>
-      </p:grpSpPr>
-      <p:sp>
-        <p:nvSpPr>
-          <p:cNvPr id="2" name="Titel 1">
-            <a:extLst>
-              <a:ext uri="{FF2B5EF4-FFF2-40B4-BE49-F238E27FC236}">
-                <a16:creationId xmlns:a16="http://schemas.microsoft.com/office/drawing/2014/main" id="{9D97ED67-0983-40BA-B344-DFF1A8F9D645}"/>
-              </a:ext>
-            </a:extLst>
-          </p:cNvPr>
-          <p:cNvSpPr>
-            <a:spLocks noGrp="1"/>
-          </p:cNvSpPr>
-          <p:nvPr>
-            <p:ph type="title"/>
-          </p:nvPr>
-        </p:nvSpPr>
-        <p:spPr/>
-        <p:txBody>
-          <a:bodyPr/>
-          <a:lstStyle/>
-          <a:p>
-            <a:r>
-              <a:rPr lang="en-US" dirty="0"/>
-              <a:t>stats</a:t>
-            </a:r>
-          </a:p>
-        </p:txBody>
-      </p:sp>
-      <p:sp>
-        <p:nvSpPr>
-          <p:cNvPr id="3" name="Inhaltsplatzhalter 2">
-            <a:extLst>
-              <a:ext uri="{FF2B5EF4-FFF2-40B4-BE49-F238E27FC236}">
-                <a16:creationId xmlns:a16="http://schemas.microsoft.com/office/drawing/2014/main" id="{2EB22B1B-35DF-494F-B9F2-FC28829ED749}"/>
-              </a:ext>
-            </a:extLst>
-          </p:cNvPr>
-          <p:cNvSpPr>
-            <a:spLocks noGrp="1"/>
-          </p:cNvSpPr>
-          <p:nvPr>
-            <p:ph idx="1"/>
-          </p:nvPr>
-        </p:nvSpPr>
-        <p:spPr/>
-        <p:txBody>
-          <a:bodyPr>
-            <a:normAutofit lnSpcReduction="10000"/>
-          </a:bodyPr>
-          <a:lstStyle/>
-          <a:p>
-            <a:r>
-              <a:rPr lang="en-US" dirty="0"/>
-              <a:t>TP:	519</a:t>
-            </a:r>
-          </a:p>
-          <a:p>
-            <a:r>
-              <a:rPr lang="en-US" dirty="0"/>
-              <a:t>FP:	517</a:t>
-            </a:r>
-          </a:p>
-          <a:p>
-            <a:r>
-              <a:rPr lang="en-US" dirty="0"/>
-              <a:t>TN:	27949</a:t>
-            </a:r>
-          </a:p>
-          <a:p>
-            <a:r>
-              <a:rPr lang="en-US" dirty="0"/>
-              <a:t>FN:	2842</a:t>
-            </a:r>
-          </a:p>
-          <a:p>
-            <a:r>
-              <a:rPr lang="en-US" dirty="0"/>
-              <a:t>FPR:	0.01816201784585119</a:t>
-            </a:r>
-          </a:p>
-          <a:p>
-            <a:r>
-              <a:rPr lang="en-US" dirty="0"/>
-              <a:t>Precision:	0.500965250965251 ± 0.08711481944094397</a:t>
-            </a:r>
-          </a:p>
-          <a:p>
-            <a:r>
-              <a:rPr lang="en-US" dirty="0"/>
-              <a:t>Recall/TPR:	0.15441832787860757 ± 0.03622178707225869</a:t>
-            </a:r>
-          </a:p>
-          <a:p>
-            <a:r>
-              <a:rPr lang="en-US" dirty="0"/>
-              <a:t>F1-score:	0.2360700477598363 ± 0.0487765726023605</a:t>
-            </a:r>
-          </a:p>
-          <a:p>
-            <a:r>
-              <a:rPr lang="en-US" dirty="0"/>
-              <a:t>MCC:	0.23597300754427067 ± 0.05293743405150672(stderr)</a:t>
-            </a:r>
-          </a:p>
-        </p:txBody>
-      </p:sp>
-      <p:sp>
-        <p:nvSpPr>
-          <p:cNvPr id="4" name="Foliennummernplatzhalter 3">
-            <a:extLst>
-              <a:ext uri="{FF2B5EF4-FFF2-40B4-BE49-F238E27FC236}">
-                <a16:creationId xmlns:a16="http://schemas.microsoft.com/office/drawing/2014/main" id="{FA0D585C-CC90-4B30-90DD-73F0D164A1C9}"/>
-              </a:ext>
-            </a:extLst>
-          </p:cNvPr>
-          <p:cNvSpPr>
-            <a:spLocks noGrp="1"/>
-          </p:cNvSpPr>
-          <p:nvPr>
-            <p:ph type="sldNum" sz="quarter" idx="12"/>
-          </p:nvPr>
-        </p:nvSpPr>
-        <p:spPr/>
-        <p:txBody>
-          <a:bodyPr/>
-          <a:lstStyle/>
-          <a:p>
-            <a:fld id="{CCAAE293-A3DA-4FFC-871C-7F0F209F7CB2}" type="slidenum">
-              <a:rPr lang="en-US" smtClean="0"/>
-              <a:t>21</a:t>
-            </a:fld>
-            <a:endParaRPr lang="en-US"/>
-          </a:p>
-        </p:txBody>
-      </p:sp>
-    </p:spTree>
-    <p:extLst>
-      <p:ext uri="{BB962C8B-B14F-4D97-AF65-F5344CB8AC3E}">
-        <p14:creationId xmlns:p14="http://schemas.microsoft.com/office/powerpoint/2010/main" val="4122554641"/>
-      </p:ext>
-    </p:extLst>
-  </p:cSld>
-  <p:clrMapOvr>
-    <a:masterClrMapping/>
-  </p:clrMapOvr>
-</p:sld>
-</file>
-
 <file path=ppt/slides/slide22.xml><?xml version="1.0" encoding="utf-8"?>
 <p:sld xmlns:a="http://schemas.openxmlformats.org/drawingml/2006/main" xmlns:r="http://schemas.openxmlformats.org/officeDocument/2006/relationships" xmlns:p="http://schemas.openxmlformats.org/presentationml/2006/main">
   <p:cSld>
@@ -6998,7 +7069,7 @@
           <p:cNvPr id="2" name="Titel 1">
             <a:extLst>
               <a:ext uri="{FF2B5EF4-FFF2-40B4-BE49-F238E27FC236}">
-                <a16:creationId xmlns:a16="http://schemas.microsoft.com/office/drawing/2014/main" id="{936C496B-94C2-4A47-81DC-95D6DBF1CF49}"/>
+                <a16:creationId xmlns:a16="http://schemas.microsoft.com/office/drawing/2014/main" id="{0A1CFA08-33E9-4E06-B481-DDF49C7CE225}"/>
               </a:ext>
             </a:extLst>
           </p:cNvPr>
@@ -7014,9 +7085,10 @@
           <a:bodyPr/>
           <a:lstStyle/>
           <a:p>
+            <a:pPr algn="ctr"/>
             <a:r>
               <a:rPr lang="de-DE" dirty="0" err="1"/>
-              <a:t>Stats</a:t>
+              <a:t>Thank</a:t>
             </a:r>
             <a:r>
               <a:rPr lang="de-DE" dirty="0"/>
@@ -7024,9 +7096,12 @@
             </a:r>
             <a:r>
               <a:rPr lang="de-DE" dirty="0" err="1"/>
-              <a:t>crossvalidation</a:t>
-            </a:r>
-            <a:endParaRPr lang="de-DE" dirty="0"/>
+              <a:t>you</a:t>
+            </a:r>
+            <a:r>
+              <a:rPr lang="de-DE" dirty="0"/>
+              <a:t>!</a:t>
+            </a:r>
           </a:p>
         </p:txBody>
       </p:sp>
@@ -7035,7 +7110,139 @@
           <p:cNvPr id="3" name="Inhaltsplatzhalter 2">
             <a:extLst>
               <a:ext uri="{FF2B5EF4-FFF2-40B4-BE49-F238E27FC236}">
-                <a16:creationId xmlns:a16="http://schemas.microsoft.com/office/drawing/2014/main" id="{5EA29DD7-D7EA-4CAD-A334-63FCFE0325A4}"/>
+                <a16:creationId xmlns:a16="http://schemas.microsoft.com/office/drawing/2014/main" id="{D1ED0091-A0CC-4522-A4E1-99602C92F687}"/>
+              </a:ext>
+            </a:extLst>
+          </p:cNvPr>
+          <p:cNvSpPr>
+            <a:spLocks noGrp="1"/>
+          </p:cNvSpPr>
+          <p:nvPr>
+            <p:ph idx="1"/>
+          </p:nvPr>
+        </p:nvSpPr>
+        <p:spPr/>
+        <p:txBody>
+          <a:bodyPr>
+            <a:normAutofit/>
+          </a:bodyPr>
+          <a:lstStyle/>
+          <a:p>
+            <a:pPr marL="0" indent="0" algn="ctr">
+              <a:buNone/>
+            </a:pPr>
+            <a:endParaRPr lang="de-DE" sz="3600" dirty="0"/>
+          </a:p>
+          <a:p>
+            <a:pPr marL="0" indent="0" algn="ctr">
+              <a:buNone/>
+            </a:pPr>
+            <a:endParaRPr lang="de-DE" sz="3600" dirty="0"/>
+          </a:p>
+          <a:p>
+            <a:pPr marL="0" indent="0" algn="ctr">
+              <a:buNone/>
+            </a:pPr>
+            <a:r>
+              <a:rPr lang="de-DE" sz="3600" dirty="0"/>
+              <a:t>Questions?</a:t>
+            </a:r>
+          </a:p>
+        </p:txBody>
+      </p:sp>
+      <p:sp>
+        <p:nvSpPr>
+          <p:cNvPr id="4" name="Foliennummernplatzhalter 3">
+            <a:extLst>
+              <a:ext uri="{FF2B5EF4-FFF2-40B4-BE49-F238E27FC236}">
+                <a16:creationId xmlns:a16="http://schemas.microsoft.com/office/drawing/2014/main" id="{6FE2A71F-4FFC-484B-93E3-04D170029A13}"/>
+              </a:ext>
+            </a:extLst>
+          </p:cNvPr>
+          <p:cNvSpPr>
+            <a:spLocks noGrp="1"/>
+          </p:cNvSpPr>
+          <p:nvPr>
+            <p:ph type="sldNum" sz="quarter" idx="12"/>
+          </p:nvPr>
+        </p:nvSpPr>
+        <p:spPr/>
+        <p:txBody>
+          <a:bodyPr/>
+          <a:lstStyle/>
+          <a:p>
+            <a:fld id="{CCAAE293-A3DA-4FFC-871C-7F0F209F7CB2}" type="slidenum">
+              <a:rPr lang="en-US" smtClean="0"/>
+              <a:t>22</a:t>
+            </a:fld>
+            <a:endParaRPr lang="en-US"/>
+          </a:p>
+        </p:txBody>
+      </p:sp>
+    </p:spTree>
+    <p:extLst>
+      <p:ext uri="{BB962C8B-B14F-4D97-AF65-F5344CB8AC3E}">
+        <p14:creationId xmlns:p14="http://schemas.microsoft.com/office/powerpoint/2010/main" val="1520254085"/>
+      </p:ext>
+    </p:extLst>
+  </p:cSld>
+  <p:clrMapOvr>
+    <a:masterClrMapping/>
+  </p:clrMapOvr>
+</p:sld>
+</file>
+
+<file path=ppt/slides/slide23.xml><?xml version="1.0" encoding="utf-8"?>
+<p:sld xmlns:a="http://schemas.openxmlformats.org/drawingml/2006/main" xmlns:r="http://schemas.openxmlformats.org/officeDocument/2006/relationships" xmlns:p="http://schemas.openxmlformats.org/presentationml/2006/main">
+  <p:cSld>
+    <p:spTree>
+      <p:nvGrpSpPr>
+        <p:cNvPr id="1" name=""/>
+        <p:cNvGrpSpPr/>
+        <p:nvPr/>
+      </p:nvGrpSpPr>
+      <p:grpSpPr>
+        <a:xfrm>
+          <a:off x="0" y="0"/>
+          <a:ext cx="0" cy="0"/>
+          <a:chOff x="0" y="0"/>
+          <a:chExt cx="0" cy="0"/>
+        </a:xfrm>
+      </p:grpSpPr>
+      <p:sp>
+        <p:nvSpPr>
+          <p:cNvPr id="2" name="Titel 1">
+            <a:extLst>
+              <a:ext uri="{FF2B5EF4-FFF2-40B4-BE49-F238E27FC236}">
+                <a16:creationId xmlns:a16="http://schemas.microsoft.com/office/drawing/2014/main" id="{9D97ED67-0983-40BA-B344-DFF1A8F9D645}"/>
+              </a:ext>
+            </a:extLst>
+          </p:cNvPr>
+          <p:cNvSpPr>
+            <a:spLocks noGrp="1"/>
+          </p:cNvSpPr>
+          <p:nvPr>
+            <p:ph type="title"/>
+          </p:nvPr>
+        </p:nvSpPr>
+        <p:spPr/>
+        <p:txBody>
+          <a:bodyPr/>
+          <a:lstStyle/>
+          <a:p>
+            <a:r>
+              <a:rPr lang="en-US" dirty="0"/>
+              <a:t>stats</a:t>
+            </a:r>
+          </a:p>
+        </p:txBody>
+      </p:sp>
+      <p:sp>
+        <p:nvSpPr>
+          <p:cNvPr id="3" name="Inhaltsplatzhalter 2">
+            <a:extLst>
+              <a:ext uri="{FF2B5EF4-FFF2-40B4-BE49-F238E27FC236}">
+                <a16:creationId xmlns:a16="http://schemas.microsoft.com/office/drawing/2014/main" id="{2EB22B1B-35DF-494F-B9F2-FC28829ED749}"/>
               </a:ext>
             </a:extLst>
           </p:cNvPr>
@@ -7054,6 +7261,180 @@
           <a:lstStyle/>
           <a:p>
             <a:r>
+              <a:rPr lang="en-US" dirty="0"/>
+              <a:t>TP:	519</a:t>
+            </a:r>
+          </a:p>
+          <a:p>
+            <a:r>
+              <a:rPr lang="en-US" dirty="0"/>
+              <a:t>FP:	517</a:t>
+            </a:r>
+          </a:p>
+          <a:p>
+            <a:r>
+              <a:rPr lang="en-US" dirty="0"/>
+              <a:t>TN:	27949</a:t>
+            </a:r>
+          </a:p>
+          <a:p>
+            <a:r>
+              <a:rPr lang="en-US" dirty="0"/>
+              <a:t>FN:	2842</a:t>
+            </a:r>
+          </a:p>
+          <a:p>
+            <a:r>
+              <a:rPr lang="en-US" dirty="0"/>
+              <a:t>FPR:	0.01816201784585119</a:t>
+            </a:r>
+          </a:p>
+          <a:p>
+            <a:r>
+              <a:rPr lang="en-US" dirty="0"/>
+              <a:t>Precision:	0.500965250965251 ± 0.016364012582564594</a:t>
+            </a:r>
+          </a:p>
+          <a:p>
+            <a:r>
+              <a:rPr lang="en-US" dirty="0"/>
+              <a:t>Recall/TPR:	0.15441832787860757 ± 0.006444302866129453</a:t>
+            </a:r>
+          </a:p>
+          <a:p>
+            <a:r>
+              <a:rPr lang="en-US" dirty="0"/>
+              <a:t>F1-score:	0.2360700477598363 ± 0.008823521693012324 </a:t>
+            </a:r>
+          </a:p>
+          <a:p>
+            <a:r>
+              <a:rPr lang="en-US" dirty="0"/>
+              <a:t>MCC:	0.23597300754427067 ± 0.00979017430278977</a:t>
+            </a:r>
+          </a:p>
+        </p:txBody>
+      </p:sp>
+      <p:sp>
+        <p:nvSpPr>
+          <p:cNvPr id="4" name="Foliennummernplatzhalter 3">
+            <a:extLst>
+              <a:ext uri="{FF2B5EF4-FFF2-40B4-BE49-F238E27FC236}">
+                <a16:creationId xmlns:a16="http://schemas.microsoft.com/office/drawing/2014/main" id="{FA0D585C-CC90-4B30-90DD-73F0D164A1C9}"/>
+              </a:ext>
+            </a:extLst>
+          </p:cNvPr>
+          <p:cNvSpPr>
+            <a:spLocks noGrp="1"/>
+          </p:cNvSpPr>
+          <p:nvPr>
+            <p:ph type="sldNum" sz="quarter" idx="12"/>
+          </p:nvPr>
+        </p:nvSpPr>
+        <p:spPr/>
+        <p:txBody>
+          <a:bodyPr/>
+          <a:lstStyle/>
+          <a:p>
+            <a:fld id="{CCAAE293-A3DA-4FFC-871C-7F0F209F7CB2}" type="slidenum">
+              <a:rPr lang="en-US" smtClean="0"/>
+              <a:t>23</a:t>
+            </a:fld>
+            <a:endParaRPr lang="en-US"/>
+          </a:p>
+        </p:txBody>
+      </p:sp>
+    </p:spTree>
+    <p:extLst>
+      <p:ext uri="{BB962C8B-B14F-4D97-AF65-F5344CB8AC3E}">
+        <p14:creationId xmlns:p14="http://schemas.microsoft.com/office/powerpoint/2010/main" val="4122554641"/>
+      </p:ext>
+    </p:extLst>
+  </p:cSld>
+  <p:clrMapOvr>
+    <a:masterClrMapping/>
+  </p:clrMapOvr>
+</p:sld>
+</file>
+
+<file path=ppt/slides/slide24.xml><?xml version="1.0" encoding="utf-8"?>
+<p:sld xmlns:a="http://schemas.openxmlformats.org/drawingml/2006/main" xmlns:r="http://schemas.openxmlformats.org/officeDocument/2006/relationships" xmlns:p="http://schemas.openxmlformats.org/presentationml/2006/main">
+  <p:cSld>
+    <p:spTree>
+      <p:nvGrpSpPr>
+        <p:cNvPr id="1" name=""/>
+        <p:cNvGrpSpPr/>
+        <p:nvPr/>
+      </p:nvGrpSpPr>
+      <p:grpSpPr>
+        <a:xfrm>
+          <a:off x="0" y="0"/>
+          <a:ext cx="0" cy="0"/>
+          <a:chOff x="0" y="0"/>
+          <a:chExt cx="0" cy="0"/>
+        </a:xfrm>
+      </p:grpSpPr>
+      <p:sp>
+        <p:nvSpPr>
+          <p:cNvPr id="2" name="Titel 1">
+            <a:extLst>
+              <a:ext uri="{FF2B5EF4-FFF2-40B4-BE49-F238E27FC236}">
+                <a16:creationId xmlns:a16="http://schemas.microsoft.com/office/drawing/2014/main" id="{936C496B-94C2-4A47-81DC-95D6DBF1CF49}"/>
+              </a:ext>
+            </a:extLst>
+          </p:cNvPr>
+          <p:cNvSpPr>
+            <a:spLocks noGrp="1"/>
+          </p:cNvSpPr>
+          <p:nvPr>
+            <p:ph type="title"/>
+          </p:nvPr>
+        </p:nvSpPr>
+        <p:spPr/>
+        <p:txBody>
+          <a:bodyPr/>
+          <a:lstStyle/>
+          <a:p>
+            <a:r>
+              <a:rPr lang="de-DE" dirty="0" err="1"/>
+              <a:t>Stats</a:t>
+            </a:r>
+            <a:r>
+              <a:rPr lang="de-DE" dirty="0"/>
+              <a:t> </a:t>
+            </a:r>
+            <a:r>
+              <a:rPr lang="de-DE" dirty="0" err="1"/>
+              <a:t>crossvalidation</a:t>
+            </a:r>
+            <a:endParaRPr lang="de-DE" dirty="0"/>
+          </a:p>
+        </p:txBody>
+      </p:sp>
+      <p:sp>
+        <p:nvSpPr>
+          <p:cNvPr id="3" name="Inhaltsplatzhalter 2">
+            <a:extLst>
+              <a:ext uri="{FF2B5EF4-FFF2-40B4-BE49-F238E27FC236}">
+                <a16:creationId xmlns:a16="http://schemas.microsoft.com/office/drawing/2014/main" id="{5EA29DD7-D7EA-4CAD-A334-63FCFE0325A4}"/>
+              </a:ext>
+            </a:extLst>
+          </p:cNvPr>
+          <p:cNvSpPr>
+            <a:spLocks noGrp="1"/>
+          </p:cNvSpPr>
+          <p:nvPr>
+            <p:ph idx="1"/>
+          </p:nvPr>
+        </p:nvSpPr>
+        <p:spPr/>
+        <p:txBody>
+          <a:bodyPr>
+            <a:normAutofit lnSpcReduction="10000"/>
+          </a:bodyPr>
+          <a:lstStyle/>
+          <a:p>
+            <a:r>
               <a:rPr lang="it-IT" dirty="0"/>
               <a:t>TP: 1401</a:t>
             </a:r>
@@ -7083,9 +7464,13 @@
             </a:r>
             <a:r>
               <a:rPr lang="en-US" dirty="0"/>
-              <a:t>± 0.03525876255192725</a:t>
-            </a:r>
-            <a:endParaRPr lang="it-IT" dirty="0"/>
+              <a:t>± </a:t>
+            </a:r>
+            <a:r>
+              <a:rPr lang="de-DE" dirty="0"/>
+              <a:t>0.006728852995094254</a:t>
+            </a:r>
+            <a:endParaRPr lang="en-US" dirty="0"/>
           </a:p>
           <a:p>
             <a:r>
@@ -7105,7 +7490,11 @@
             </a:r>
             <a:r>
               <a:rPr lang="en-US" dirty="0"/>
-              <a:t>± 0.09980623925902139</a:t>
+              <a:t>± </a:t>
+            </a:r>
+            <a:r>
+              <a:rPr lang="de-DE" dirty="0"/>
+              <a:t>0.01515588223022108</a:t>
             </a:r>
             <a:endParaRPr lang="it-IT" dirty="0"/>
           </a:p>
@@ -7116,15 +7505,23 @@
             </a:r>
             <a:r>
               <a:rPr lang="en-US" dirty="0"/>
-              <a:t>± 0.05680394618676588</a:t>
-            </a:r>
+              <a:t>± </a:t>
+            </a:r>
+            <a:r>
+              <a:rPr lang="de-DE" dirty="0"/>
+              <a:t>0.009743841686838386</a:t>
+            </a:r>
+            <a:endParaRPr lang="en-US" dirty="0"/>
           </a:p>
           <a:p>
             <a:r>
               <a:rPr lang="en-US" dirty="0"/>
-              <a:t>F1: 0.1898892068383594 ± 0.04955890189837977</a:t>
-            </a:r>
-            <a:endParaRPr lang="de-DE" dirty="0"/>
+              <a:t>F1: 0.1898892068383594 ± </a:t>
+            </a:r>
+            <a:r>
+              <a:rPr lang="de-DE" dirty="0"/>
+              <a:t>0.008877620919506887</a:t>
+            </a:r>
           </a:p>
         </p:txBody>
       </p:sp>
@@ -7151,7 +7548,7 @@
           <a:p>
             <a:fld id="{CCAAE293-A3DA-4FFC-871C-7F0F209F7CB2}" type="slidenum">
               <a:rPr lang="en-US" smtClean="0"/>
-              <a:t>22</a:t>
+              <a:t>24</a:t>
             </a:fld>
             <a:endParaRPr lang="en-US"/>
           </a:p>
@@ -7787,106 +8184,10 @@
       </p:grpSpPr>
       <p:sp>
         <p:nvSpPr>
-          <p:cNvPr id="2" name="Titel 1">
-            <a:extLst>
-              <a:ext uri="{FF2B5EF4-FFF2-40B4-BE49-F238E27FC236}">
-                <a16:creationId xmlns:a16="http://schemas.microsoft.com/office/drawing/2014/main" id="{9591C612-F88B-4465-8B3F-44166E3449EA}"/>
-              </a:ext>
-            </a:extLst>
-          </p:cNvPr>
-          <p:cNvSpPr>
-            <a:spLocks noGrp="1"/>
-          </p:cNvSpPr>
-          <p:nvPr>
-            <p:ph type="title"/>
-          </p:nvPr>
-        </p:nvSpPr>
-        <p:spPr/>
-        <p:txBody>
-          <a:bodyPr/>
-          <a:lstStyle/>
-          <a:p>
-            <a:pPr algn="ctr"/>
-            <a:r>
-              <a:rPr lang="en-US" dirty="0"/>
-              <a:t>Feature: raw scores</a:t>
-            </a:r>
-          </a:p>
-        </p:txBody>
-      </p:sp>
-      <p:sp>
-        <p:nvSpPr>
-          <p:cNvPr id="3" name="Inhaltsplatzhalter 2">
-            <a:extLst>
-              <a:ext uri="{FF2B5EF4-FFF2-40B4-BE49-F238E27FC236}">
-                <a16:creationId xmlns:a16="http://schemas.microsoft.com/office/drawing/2014/main" id="{5B3C0166-0693-45E2-8540-A3B3EA29A65E}"/>
-              </a:ext>
-            </a:extLst>
-          </p:cNvPr>
-          <p:cNvSpPr>
-            <a:spLocks noGrp="1"/>
-          </p:cNvSpPr>
-          <p:nvPr>
-            <p:ph idx="1"/>
-          </p:nvPr>
-        </p:nvSpPr>
-        <p:spPr/>
-        <p:txBody>
-          <a:bodyPr/>
-          <a:lstStyle/>
-          <a:p>
-            <a:r>
-              <a:rPr lang="en-US" dirty="0"/>
-              <a:t>Predicts similar to random</a:t>
-            </a:r>
-          </a:p>
-          <a:p>
-            <a:r>
-              <a:rPr lang="en-US" dirty="0"/>
-              <a:t>Problem: Too little Information to get meaningful results</a:t>
-            </a:r>
-          </a:p>
-          <a:p>
-            <a:r>
-              <a:rPr lang="en-US" dirty="0"/>
-              <a:t>Solution: input raw scores</a:t>
-            </a:r>
-          </a:p>
-          <a:p>
-            <a:endParaRPr lang="en-US" dirty="0"/>
-          </a:p>
-          <a:p>
-            <a:endParaRPr lang="en-US" dirty="0"/>
-          </a:p>
-          <a:p>
-            <a:pPr marL="0" indent="0">
-              <a:buNone/>
-            </a:pPr>
-            <a:r>
-              <a:rPr lang="en-US" dirty="0"/>
-              <a:t>[48, -1, 75, -1, 70, -2, 79, -3, 36, -1, 58, 0, 76, -2, 73, -3, 67, -2, 15, 1, </a:t>
-            </a:r>
-          </a:p>
-          <a:p>
-            <a:pPr marL="0" indent="0">
-              <a:buNone/>
-            </a:pPr>
-            <a:r>
-              <a:rPr lang="en-US" dirty="0"/>
-              <a:t>    24, 2, 76, -1, 0, 0, 30, 0, 79, -2, 65, -1, 62, -1, 68, -1, 51, -1, 27, 1]</a:t>
-            </a:r>
-          </a:p>
-          <a:p>
-            <a:endParaRPr lang="en-US" dirty="0"/>
-          </a:p>
-        </p:txBody>
-      </p:sp>
-      <p:sp>
-        <p:nvSpPr>
           <p:cNvPr id="4" name="Foliennummernplatzhalter 3">
             <a:extLst>
               <a:ext uri="{FF2B5EF4-FFF2-40B4-BE49-F238E27FC236}">
-                <a16:creationId xmlns:a16="http://schemas.microsoft.com/office/drawing/2014/main" id="{74F85361-5C17-48B6-93DB-1EDA5C35426C}"/>
+                <a16:creationId xmlns:a16="http://schemas.microsoft.com/office/drawing/2014/main" id="{0894080F-5EA4-4230-9BA5-ACC49E6CC441}"/>
               </a:ext>
             </a:extLst>
           </p:cNvPr>
@@ -7910,10 +8211,748 @@
           </a:p>
         </p:txBody>
       </p:sp>
+      <p:pic>
+        <p:nvPicPr>
+          <p:cNvPr id="5" name="table">
+            <a:extLst>
+              <a:ext uri="{FF2B5EF4-FFF2-40B4-BE49-F238E27FC236}">
+                <a16:creationId xmlns:a16="http://schemas.microsoft.com/office/drawing/2014/main" id="{C6419AD2-7A35-45F1-AD9A-9DB7F960EBB0}"/>
+              </a:ext>
+            </a:extLst>
+          </p:cNvPr>
+          <p:cNvPicPr>
+            <a:picLocks noChangeAspect="1"/>
+          </p:cNvPicPr>
+          <p:nvPr/>
+        </p:nvPicPr>
+        <p:blipFill>
+          <a:blip r:embed="rId2"/>
+          <a:stretch>
+            <a:fillRect/>
+          </a:stretch>
+        </p:blipFill>
+        <p:spPr>
+          <a:xfrm>
+            <a:off x="852890" y="1348229"/>
+            <a:ext cx="3061228" cy="5077212"/>
+          </a:xfrm>
+          <a:prstGeom prst="rect">
+            <a:avLst/>
+          </a:prstGeom>
+        </p:spPr>
+      </p:pic>
+      <p:pic>
+        <p:nvPicPr>
+          <p:cNvPr id="6" name="table">
+            <a:extLst>
+              <a:ext uri="{FF2B5EF4-FFF2-40B4-BE49-F238E27FC236}">
+                <a16:creationId xmlns:a16="http://schemas.microsoft.com/office/drawing/2014/main" id="{98871E3C-09A0-42E8-9DC4-ADE93C6F94E3}"/>
+              </a:ext>
+            </a:extLst>
+          </p:cNvPr>
+          <p:cNvPicPr>
+            <a:picLocks noChangeAspect="1"/>
+          </p:cNvPicPr>
+          <p:nvPr/>
+        </p:nvPicPr>
+        <p:blipFill>
+          <a:blip r:embed="rId3"/>
+          <a:stretch>
+            <a:fillRect/>
+          </a:stretch>
+        </p:blipFill>
+        <p:spPr>
+          <a:xfrm>
+            <a:off x="7038242" y="1403154"/>
+            <a:ext cx="4300868" cy="4967360"/>
+          </a:xfrm>
+          <a:prstGeom prst="rect">
+            <a:avLst/>
+          </a:prstGeom>
+        </p:spPr>
+      </p:pic>
+      <p:sp>
+        <p:nvSpPr>
+          <p:cNvPr id="7" name="CUTOFFS">
+            <a:extLst>
+              <a:ext uri="{FF2B5EF4-FFF2-40B4-BE49-F238E27FC236}">
+                <a16:creationId xmlns:a16="http://schemas.microsoft.com/office/drawing/2014/main" id="{8858DAE9-DD3C-43D5-829B-4088D1D3D367}"/>
+              </a:ext>
+            </a:extLst>
+          </p:cNvPr>
+          <p:cNvSpPr txBox="1"/>
+          <p:nvPr/>
+        </p:nvSpPr>
+        <p:spPr>
+          <a:xfrm>
+            <a:off x="1526925" y="432559"/>
+            <a:ext cx="1713159" cy="535940"/>
+          </a:xfrm>
+          <a:prstGeom prst="rect">
+            <a:avLst/>
+          </a:prstGeom>
+          <a:ln w="12700">
+            <a:miter lim="400000"/>
+          </a:ln>
+          <a:extLst>
+            <a:ext uri="{C572A759-6A51-4108-AA02-DFA0A04FC94B}">
+              <ma14:wrappingTextBoxFlag xmlns="" xmlns:m="http://schemas.openxmlformats.org/officeDocument/2006/math" xmlns:a14="http://schemas.microsoft.com/office/drawing/2010/main" xmlns:ma14="http://schemas.microsoft.com/office/mac/drawingml/2011/main" xmlns:lc="http://schemas.openxmlformats.org/drawingml/2006/lockedCanvas" val="1"/>
+            </a:ext>
+          </a:extLst>
+        </p:spPr>
+        <p:txBody>
+          <a:bodyPr wrap="none" lIns="45719" rIns="45719">
+            <a:spAutoFit/>
+          </a:bodyPr>
+          <a:lstStyle>
+            <a:defPPr marL="0" marR="0" indent="0" algn="l" defTabSz="914400" rtl="0" fontAlgn="auto" latinLnBrk="1" hangingPunct="0">
+              <a:lnSpc>
+                <a:spcPct val="100000"/>
+              </a:lnSpc>
+              <a:spcBef>
+                <a:spcPts val="0"/>
+              </a:spcBef>
+              <a:spcAft>
+                <a:spcPts val="0"/>
+              </a:spcAft>
+              <a:buClrTx/>
+              <a:buSzTx/>
+              <a:buFontTx/>
+              <a:buNone/>
+              <a:tabLst/>
+              <a:defRPr kumimoji="0" sz="1800" b="0" i="0" u="none" strike="noStrike" cap="none" spc="0" normalizeH="0" baseline="0">
+                <a:ln>
+                  <a:noFill/>
+                </a:ln>
+                <a:solidFill>
+                  <a:srgbClr val="000000"/>
+                </a:solidFill>
+                <a:effectLst/>
+                <a:uFillTx/>
+              </a:defRPr>
+            </a:defPPr>
+            <a:lvl1pPr marL="0" marR="0" indent="0" algn="l" defTabSz="914400" rtl="0" fontAlgn="auto" latinLnBrk="0" hangingPunct="0">
+              <a:lnSpc>
+                <a:spcPct val="100000"/>
+              </a:lnSpc>
+              <a:spcBef>
+                <a:spcPts val="0"/>
+              </a:spcBef>
+              <a:spcAft>
+                <a:spcPts val="0"/>
+              </a:spcAft>
+              <a:buClrTx/>
+              <a:buSzTx/>
+              <a:buFontTx/>
+              <a:buNone/>
+              <a:tabLst/>
+              <a:defRPr kumimoji="0" sz="1800" b="0" i="0" u="none" strike="noStrike" cap="none" spc="0" normalizeH="0" baseline="0">
+                <a:ln>
+                  <a:noFill/>
+                </a:ln>
+                <a:solidFill>
+                  <a:srgbClr val="000000"/>
+                </a:solidFill>
+                <a:effectLst/>
+                <a:uFillTx/>
+                <a:latin typeface="+mn-lt"/>
+                <a:ea typeface="+mn-ea"/>
+                <a:cs typeface="+mn-cs"/>
+                <a:sym typeface="Calibri"/>
+              </a:defRPr>
+            </a:lvl1pPr>
+            <a:lvl2pPr marL="0" marR="0" indent="457200" algn="l" defTabSz="914400" rtl="0" fontAlgn="auto" latinLnBrk="0" hangingPunct="0">
+              <a:lnSpc>
+                <a:spcPct val="100000"/>
+              </a:lnSpc>
+              <a:spcBef>
+                <a:spcPts val="0"/>
+              </a:spcBef>
+              <a:spcAft>
+                <a:spcPts val="0"/>
+              </a:spcAft>
+              <a:buClrTx/>
+              <a:buSzTx/>
+              <a:buFontTx/>
+              <a:buNone/>
+              <a:tabLst/>
+              <a:defRPr kumimoji="0" sz="1800" b="0" i="0" u="none" strike="noStrike" cap="none" spc="0" normalizeH="0" baseline="0">
+                <a:ln>
+                  <a:noFill/>
+                </a:ln>
+                <a:solidFill>
+                  <a:srgbClr val="000000"/>
+                </a:solidFill>
+                <a:effectLst/>
+                <a:uFillTx/>
+                <a:latin typeface="+mn-lt"/>
+                <a:ea typeface="+mn-ea"/>
+                <a:cs typeface="+mn-cs"/>
+                <a:sym typeface="Calibri"/>
+              </a:defRPr>
+            </a:lvl2pPr>
+            <a:lvl3pPr marL="0" marR="0" indent="914400" algn="l" defTabSz="914400" rtl="0" fontAlgn="auto" latinLnBrk="0" hangingPunct="0">
+              <a:lnSpc>
+                <a:spcPct val="100000"/>
+              </a:lnSpc>
+              <a:spcBef>
+                <a:spcPts val="0"/>
+              </a:spcBef>
+              <a:spcAft>
+                <a:spcPts val="0"/>
+              </a:spcAft>
+              <a:buClrTx/>
+              <a:buSzTx/>
+              <a:buFontTx/>
+              <a:buNone/>
+              <a:tabLst/>
+              <a:defRPr kumimoji="0" sz="1800" b="0" i="0" u="none" strike="noStrike" cap="none" spc="0" normalizeH="0" baseline="0">
+                <a:ln>
+                  <a:noFill/>
+                </a:ln>
+                <a:solidFill>
+                  <a:srgbClr val="000000"/>
+                </a:solidFill>
+                <a:effectLst/>
+                <a:uFillTx/>
+                <a:latin typeface="+mn-lt"/>
+                <a:ea typeface="+mn-ea"/>
+                <a:cs typeface="+mn-cs"/>
+                <a:sym typeface="Calibri"/>
+              </a:defRPr>
+            </a:lvl3pPr>
+            <a:lvl4pPr marL="0" marR="0" indent="1371600" algn="l" defTabSz="914400" rtl="0" fontAlgn="auto" latinLnBrk="0" hangingPunct="0">
+              <a:lnSpc>
+                <a:spcPct val="100000"/>
+              </a:lnSpc>
+              <a:spcBef>
+                <a:spcPts val="0"/>
+              </a:spcBef>
+              <a:spcAft>
+                <a:spcPts val="0"/>
+              </a:spcAft>
+              <a:buClrTx/>
+              <a:buSzTx/>
+              <a:buFontTx/>
+              <a:buNone/>
+              <a:tabLst/>
+              <a:defRPr kumimoji="0" sz="1800" b="0" i="0" u="none" strike="noStrike" cap="none" spc="0" normalizeH="0" baseline="0">
+                <a:ln>
+                  <a:noFill/>
+                </a:ln>
+                <a:solidFill>
+                  <a:srgbClr val="000000"/>
+                </a:solidFill>
+                <a:effectLst/>
+                <a:uFillTx/>
+                <a:latin typeface="+mn-lt"/>
+                <a:ea typeface="+mn-ea"/>
+                <a:cs typeface="+mn-cs"/>
+                <a:sym typeface="Calibri"/>
+              </a:defRPr>
+            </a:lvl4pPr>
+            <a:lvl5pPr marL="0" marR="0" indent="1828800" algn="l" defTabSz="914400" rtl="0" fontAlgn="auto" latinLnBrk="0" hangingPunct="0">
+              <a:lnSpc>
+                <a:spcPct val="100000"/>
+              </a:lnSpc>
+              <a:spcBef>
+                <a:spcPts val="0"/>
+              </a:spcBef>
+              <a:spcAft>
+                <a:spcPts val="0"/>
+              </a:spcAft>
+              <a:buClrTx/>
+              <a:buSzTx/>
+              <a:buFontTx/>
+              <a:buNone/>
+              <a:tabLst/>
+              <a:defRPr kumimoji="0" sz="1800" b="0" i="0" u="none" strike="noStrike" cap="none" spc="0" normalizeH="0" baseline="0">
+                <a:ln>
+                  <a:noFill/>
+                </a:ln>
+                <a:solidFill>
+                  <a:srgbClr val="000000"/>
+                </a:solidFill>
+                <a:effectLst/>
+                <a:uFillTx/>
+                <a:latin typeface="+mn-lt"/>
+                <a:ea typeface="+mn-ea"/>
+                <a:cs typeface="+mn-cs"/>
+                <a:sym typeface="Calibri"/>
+              </a:defRPr>
+            </a:lvl5pPr>
+            <a:lvl6pPr marL="0" marR="0" indent="2286000" algn="l" defTabSz="914400" rtl="0" fontAlgn="auto" latinLnBrk="0" hangingPunct="0">
+              <a:lnSpc>
+                <a:spcPct val="100000"/>
+              </a:lnSpc>
+              <a:spcBef>
+                <a:spcPts val="0"/>
+              </a:spcBef>
+              <a:spcAft>
+                <a:spcPts val="0"/>
+              </a:spcAft>
+              <a:buClrTx/>
+              <a:buSzTx/>
+              <a:buFontTx/>
+              <a:buNone/>
+              <a:tabLst/>
+              <a:defRPr kumimoji="0" sz="1800" b="0" i="0" u="none" strike="noStrike" cap="none" spc="0" normalizeH="0" baseline="0">
+                <a:ln>
+                  <a:noFill/>
+                </a:ln>
+                <a:solidFill>
+                  <a:srgbClr val="000000"/>
+                </a:solidFill>
+                <a:effectLst/>
+                <a:uFillTx/>
+                <a:latin typeface="+mn-lt"/>
+                <a:ea typeface="+mn-ea"/>
+                <a:cs typeface="+mn-cs"/>
+                <a:sym typeface="Calibri"/>
+              </a:defRPr>
+            </a:lvl6pPr>
+            <a:lvl7pPr marL="0" marR="0" indent="2743200" algn="l" defTabSz="914400" rtl="0" fontAlgn="auto" latinLnBrk="0" hangingPunct="0">
+              <a:lnSpc>
+                <a:spcPct val="100000"/>
+              </a:lnSpc>
+              <a:spcBef>
+                <a:spcPts val="0"/>
+              </a:spcBef>
+              <a:spcAft>
+                <a:spcPts val="0"/>
+              </a:spcAft>
+              <a:buClrTx/>
+              <a:buSzTx/>
+              <a:buFontTx/>
+              <a:buNone/>
+              <a:tabLst/>
+              <a:defRPr kumimoji="0" sz="1800" b="0" i="0" u="none" strike="noStrike" cap="none" spc="0" normalizeH="0" baseline="0">
+                <a:ln>
+                  <a:noFill/>
+                </a:ln>
+                <a:solidFill>
+                  <a:srgbClr val="000000"/>
+                </a:solidFill>
+                <a:effectLst/>
+                <a:uFillTx/>
+                <a:latin typeface="+mn-lt"/>
+                <a:ea typeface="+mn-ea"/>
+                <a:cs typeface="+mn-cs"/>
+                <a:sym typeface="Calibri"/>
+              </a:defRPr>
+            </a:lvl7pPr>
+            <a:lvl8pPr marL="0" marR="0" indent="3200400" algn="l" defTabSz="914400" rtl="0" fontAlgn="auto" latinLnBrk="0" hangingPunct="0">
+              <a:lnSpc>
+                <a:spcPct val="100000"/>
+              </a:lnSpc>
+              <a:spcBef>
+                <a:spcPts val="0"/>
+              </a:spcBef>
+              <a:spcAft>
+                <a:spcPts val="0"/>
+              </a:spcAft>
+              <a:buClrTx/>
+              <a:buSzTx/>
+              <a:buFontTx/>
+              <a:buNone/>
+              <a:tabLst/>
+              <a:defRPr kumimoji="0" sz="1800" b="0" i="0" u="none" strike="noStrike" cap="none" spc="0" normalizeH="0" baseline="0">
+                <a:ln>
+                  <a:noFill/>
+                </a:ln>
+                <a:solidFill>
+                  <a:srgbClr val="000000"/>
+                </a:solidFill>
+                <a:effectLst/>
+                <a:uFillTx/>
+                <a:latin typeface="+mn-lt"/>
+                <a:ea typeface="+mn-ea"/>
+                <a:cs typeface="+mn-cs"/>
+                <a:sym typeface="Calibri"/>
+              </a:defRPr>
+            </a:lvl8pPr>
+            <a:lvl9pPr marL="0" marR="0" indent="3657600" algn="l" defTabSz="914400" rtl="0" fontAlgn="auto" latinLnBrk="0" hangingPunct="0">
+              <a:lnSpc>
+                <a:spcPct val="100000"/>
+              </a:lnSpc>
+              <a:spcBef>
+                <a:spcPts val="0"/>
+              </a:spcBef>
+              <a:spcAft>
+                <a:spcPts val="0"/>
+              </a:spcAft>
+              <a:buClrTx/>
+              <a:buSzTx/>
+              <a:buFontTx/>
+              <a:buNone/>
+              <a:tabLst/>
+              <a:defRPr kumimoji="0" sz="1800" b="0" i="0" u="none" strike="noStrike" cap="none" spc="0" normalizeH="0" baseline="0">
+                <a:ln>
+                  <a:noFill/>
+                </a:ln>
+                <a:solidFill>
+                  <a:srgbClr val="000000"/>
+                </a:solidFill>
+                <a:effectLst/>
+                <a:uFillTx/>
+                <a:latin typeface="+mn-lt"/>
+                <a:ea typeface="+mn-ea"/>
+                <a:cs typeface="+mn-cs"/>
+                <a:sym typeface="Calibri"/>
+              </a:defRPr>
+            </a:lvl9pPr>
+          </a:lstStyle>
+          <a:p>
+            <a:r>
+              <a:rPr dirty="0"/>
+              <a:t>CUTOFFS</a:t>
+            </a:r>
+          </a:p>
+        </p:txBody>
+      </p:sp>
+      <p:sp>
+        <p:nvSpPr>
+          <p:cNvPr id="8" name="CONVERSION">
+            <a:extLst>
+              <a:ext uri="{FF2B5EF4-FFF2-40B4-BE49-F238E27FC236}">
+                <a16:creationId xmlns:a16="http://schemas.microsoft.com/office/drawing/2014/main" id="{ECA851A3-E7E0-4024-BF54-6BC445354D9E}"/>
+              </a:ext>
+            </a:extLst>
+          </p:cNvPr>
+          <p:cNvSpPr txBox="1"/>
+          <p:nvPr/>
+        </p:nvSpPr>
+        <p:spPr>
+          <a:xfrm>
+            <a:off x="8004303" y="432559"/>
+            <a:ext cx="2368747" cy="535941"/>
+          </a:xfrm>
+          <a:prstGeom prst="rect">
+            <a:avLst/>
+          </a:prstGeom>
+          <a:ln w="12700">
+            <a:miter lim="400000"/>
+          </a:ln>
+          <a:extLst>
+            <a:ext uri="{C572A759-6A51-4108-AA02-DFA0A04FC94B}">
+              <ma14:wrappingTextBoxFlag xmlns="" xmlns:m="http://schemas.openxmlformats.org/officeDocument/2006/math" xmlns:a14="http://schemas.microsoft.com/office/drawing/2010/main" xmlns:ma14="http://schemas.microsoft.com/office/mac/drawingml/2011/main" xmlns:lc="http://schemas.openxmlformats.org/drawingml/2006/lockedCanvas" val="1"/>
+            </a:ext>
+          </a:extLst>
+        </p:spPr>
+        <p:txBody>
+          <a:bodyPr wrap="none" lIns="45719" rIns="45719">
+            <a:spAutoFit/>
+          </a:bodyPr>
+          <a:lstStyle>
+            <a:defPPr marL="0" marR="0" indent="0" algn="l" defTabSz="914400" rtl="0" fontAlgn="auto" latinLnBrk="1" hangingPunct="0">
+              <a:lnSpc>
+                <a:spcPct val="100000"/>
+              </a:lnSpc>
+              <a:spcBef>
+                <a:spcPts val="0"/>
+              </a:spcBef>
+              <a:spcAft>
+                <a:spcPts val="0"/>
+              </a:spcAft>
+              <a:buClrTx/>
+              <a:buSzTx/>
+              <a:buFontTx/>
+              <a:buNone/>
+              <a:tabLst/>
+              <a:defRPr kumimoji="0" sz="1800" b="0" i="0" u="none" strike="noStrike" cap="none" spc="0" normalizeH="0" baseline="0">
+                <a:ln>
+                  <a:noFill/>
+                </a:ln>
+                <a:solidFill>
+                  <a:srgbClr val="000000"/>
+                </a:solidFill>
+                <a:effectLst/>
+                <a:uFillTx/>
+              </a:defRPr>
+            </a:defPPr>
+            <a:lvl1pPr marL="0" marR="0" indent="0" algn="l" defTabSz="914400" rtl="0" fontAlgn="auto" latinLnBrk="0" hangingPunct="0">
+              <a:lnSpc>
+                <a:spcPct val="100000"/>
+              </a:lnSpc>
+              <a:spcBef>
+                <a:spcPts val="0"/>
+              </a:spcBef>
+              <a:spcAft>
+                <a:spcPts val="0"/>
+              </a:spcAft>
+              <a:buClrTx/>
+              <a:buSzTx/>
+              <a:buFontTx/>
+              <a:buNone/>
+              <a:tabLst/>
+              <a:defRPr kumimoji="0" sz="1800" b="0" i="0" u="none" strike="noStrike" cap="none" spc="0" normalizeH="0" baseline="0">
+                <a:ln>
+                  <a:noFill/>
+                </a:ln>
+                <a:solidFill>
+                  <a:srgbClr val="000000"/>
+                </a:solidFill>
+                <a:effectLst/>
+                <a:uFillTx/>
+                <a:latin typeface="+mn-lt"/>
+                <a:ea typeface="+mn-ea"/>
+                <a:cs typeface="+mn-cs"/>
+                <a:sym typeface="Calibri"/>
+              </a:defRPr>
+            </a:lvl1pPr>
+            <a:lvl2pPr marL="0" marR="0" indent="457200" algn="l" defTabSz="914400" rtl="0" fontAlgn="auto" latinLnBrk="0" hangingPunct="0">
+              <a:lnSpc>
+                <a:spcPct val="100000"/>
+              </a:lnSpc>
+              <a:spcBef>
+                <a:spcPts val="0"/>
+              </a:spcBef>
+              <a:spcAft>
+                <a:spcPts val="0"/>
+              </a:spcAft>
+              <a:buClrTx/>
+              <a:buSzTx/>
+              <a:buFontTx/>
+              <a:buNone/>
+              <a:tabLst/>
+              <a:defRPr kumimoji="0" sz="1800" b="0" i="0" u="none" strike="noStrike" cap="none" spc="0" normalizeH="0" baseline="0">
+                <a:ln>
+                  <a:noFill/>
+                </a:ln>
+                <a:solidFill>
+                  <a:srgbClr val="000000"/>
+                </a:solidFill>
+                <a:effectLst/>
+                <a:uFillTx/>
+                <a:latin typeface="+mn-lt"/>
+                <a:ea typeface="+mn-ea"/>
+                <a:cs typeface="+mn-cs"/>
+                <a:sym typeface="Calibri"/>
+              </a:defRPr>
+            </a:lvl2pPr>
+            <a:lvl3pPr marL="0" marR="0" indent="914400" algn="l" defTabSz="914400" rtl="0" fontAlgn="auto" latinLnBrk="0" hangingPunct="0">
+              <a:lnSpc>
+                <a:spcPct val="100000"/>
+              </a:lnSpc>
+              <a:spcBef>
+                <a:spcPts val="0"/>
+              </a:spcBef>
+              <a:spcAft>
+                <a:spcPts val="0"/>
+              </a:spcAft>
+              <a:buClrTx/>
+              <a:buSzTx/>
+              <a:buFontTx/>
+              <a:buNone/>
+              <a:tabLst/>
+              <a:defRPr kumimoji="0" sz="1800" b="0" i="0" u="none" strike="noStrike" cap="none" spc="0" normalizeH="0" baseline="0">
+                <a:ln>
+                  <a:noFill/>
+                </a:ln>
+                <a:solidFill>
+                  <a:srgbClr val="000000"/>
+                </a:solidFill>
+                <a:effectLst/>
+                <a:uFillTx/>
+                <a:latin typeface="+mn-lt"/>
+                <a:ea typeface="+mn-ea"/>
+                <a:cs typeface="+mn-cs"/>
+                <a:sym typeface="Calibri"/>
+              </a:defRPr>
+            </a:lvl3pPr>
+            <a:lvl4pPr marL="0" marR="0" indent="1371600" algn="l" defTabSz="914400" rtl="0" fontAlgn="auto" latinLnBrk="0" hangingPunct="0">
+              <a:lnSpc>
+                <a:spcPct val="100000"/>
+              </a:lnSpc>
+              <a:spcBef>
+                <a:spcPts val="0"/>
+              </a:spcBef>
+              <a:spcAft>
+                <a:spcPts val="0"/>
+              </a:spcAft>
+              <a:buClrTx/>
+              <a:buSzTx/>
+              <a:buFontTx/>
+              <a:buNone/>
+              <a:tabLst/>
+              <a:defRPr kumimoji="0" sz="1800" b="0" i="0" u="none" strike="noStrike" cap="none" spc="0" normalizeH="0" baseline="0">
+                <a:ln>
+                  <a:noFill/>
+                </a:ln>
+                <a:solidFill>
+                  <a:srgbClr val="000000"/>
+                </a:solidFill>
+                <a:effectLst/>
+                <a:uFillTx/>
+                <a:latin typeface="+mn-lt"/>
+                <a:ea typeface="+mn-ea"/>
+                <a:cs typeface="+mn-cs"/>
+                <a:sym typeface="Calibri"/>
+              </a:defRPr>
+            </a:lvl4pPr>
+            <a:lvl5pPr marL="0" marR="0" indent="1828800" algn="l" defTabSz="914400" rtl="0" fontAlgn="auto" latinLnBrk="0" hangingPunct="0">
+              <a:lnSpc>
+                <a:spcPct val="100000"/>
+              </a:lnSpc>
+              <a:spcBef>
+                <a:spcPts val="0"/>
+              </a:spcBef>
+              <a:spcAft>
+                <a:spcPts val="0"/>
+              </a:spcAft>
+              <a:buClrTx/>
+              <a:buSzTx/>
+              <a:buFontTx/>
+              <a:buNone/>
+              <a:tabLst/>
+              <a:defRPr kumimoji="0" sz="1800" b="0" i="0" u="none" strike="noStrike" cap="none" spc="0" normalizeH="0" baseline="0">
+                <a:ln>
+                  <a:noFill/>
+                </a:ln>
+                <a:solidFill>
+                  <a:srgbClr val="000000"/>
+                </a:solidFill>
+                <a:effectLst/>
+                <a:uFillTx/>
+                <a:latin typeface="+mn-lt"/>
+                <a:ea typeface="+mn-ea"/>
+                <a:cs typeface="+mn-cs"/>
+                <a:sym typeface="Calibri"/>
+              </a:defRPr>
+            </a:lvl5pPr>
+            <a:lvl6pPr marL="0" marR="0" indent="2286000" algn="l" defTabSz="914400" rtl="0" fontAlgn="auto" latinLnBrk="0" hangingPunct="0">
+              <a:lnSpc>
+                <a:spcPct val="100000"/>
+              </a:lnSpc>
+              <a:spcBef>
+                <a:spcPts val="0"/>
+              </a:spcBef>
+              <a:spcAft>
+                <a:spcPts val="0"/>
+              </a:spcAft>
+              <a:buClrTx/>
+              <a:buSzTx/>
+              <a:buFontTx/>
+              <a:buNone/>
+              <a:tabLst/>
+              <a:defRPr kumimoji="0" sz="1800" b="0" i="0" u="none" strike="noStrike" cap="none" spc="0" normalizeH="0" baseline="0">
+                <a:ln>
+                  <a:noFill/>
+                </a:ln>
+                <a:solidFill>
+                  <a:srgbClr val="000000"/>
+                </a:solidFill>
+                <a:effectLst/>
+                <a:uFillTx/>
+                <a:latin typeface="+mn-lt"/>
+                <a:ea typeface="+mn-ea"/>
+                <a:cs typeface="+mn-cs"/>
+                <a:sym typeface="Calibri"/>
+              </a:defRPr>
+            </a:lvl6pPr>
+            <a:lvl7pPr marL="0" marR="0" indent="2743200" algn="l" defTabSz="914400" rtl="0" fontAlgn="auto" latinLnBrk="0" hangingPunct="0">
+              <a:lnSpc>
+                <a:spcPct val="100000"/>
+              </a:lnSpc>
+              <a:spcBef>
+                <a:spcPts val="0"/>
+              </a:spcBef>
+              <a:spcAft>
+                <a:spcPts val="0"/>
+              </a:spcAft>
+              <a:buClrTx/>
+              <a:buSzTx/>
+              <a:buFontTx/>
+              <a:buNone/>
+              <a:tabLst/>
+              <a:defRPr kumimoji="0" sz="1800" b="0" i="0" u="none" strike="noStrike" cap="none" spc="0" normalizeH="0" baseline="0">
+                <a:ln>
+                  <a:noFill/>
+                </a:ln>
+                <a:solidFill>
+                  <a:srgbClr val="000000"/>
+                </a:solidFill>
+                <a:effectLst/>
+                <a:uFillTx/>
+                <a:latin typeface="+mn-lt"/>
+                <a:ea typeface="+mn-ea"/>
+                <a:cs typeface="+mn-cs"/>
+                <a:sym typeface="Calibri"/>
+              </a:defRPr>
+            </a:lvl7pPr>
+            <a:lvl8pPr marL="0" marR="0" indent="3200400" algn="l" defTabSz="914400" rtl="0" fontAlgn="auto" latinLnBrk="0" hangingPunct="0">
+              <a:lnSpc>
+                <a:spcPct val="100000"/>
+              </a:lnSpc>
+              <a:spcBef>
+                <a:spcPts val="0"/>
+              </a:spcBef>
+              <a:spcAft>
+                <a:spcPts val="0"/>
+              </a:spcAft>
+              <a:buClrTx/>
+              <a:buSzTx/>
+              <a:buFontTx/>
+              <a:buNone/>
+              <a:tabLst/>
+              <a:defRPr kumimoji="0" sz="1800" b="0" i="0" u="none" strike="noStrike" cap="none" spc="0" normalizeH="0" baseline="0">
+                <a:ln>
+                  <a:noFill/>
+                </a:ln>
+                <a:solidFill>
+                  <a:srgbClr val="000000"/>
+                </a:solidFill>
+                <a:effectLst/>
+                <a:uFillTx/>
+                <a:latin typeface="+mn-lt"/>
+                <a:ea typeface="+mn-ea"/>
+                <a:cs typeface="+mn-cs"/>
+                <a:sym typeface="Calibri"/>
+              </a:defRPr>
+            </a:lvl8pPr>
+            <a:lvl9pPr marL="0" marR="0" indent="3657600" algn="l" defTabSz="914400" rtl="0" fontAlgn="auto" latinLnBrk="0" hangingPunct="0">
+              <a:lnSpc>
+                <a:spcPct val="100000"/>
+              </a:lnSpc>
+              <a:spcBef>
+                <a:spcPts val="0"/>
+              </a:spcBef>
+              <a:spcAft>
+                <a:spcPts val="0"/>
+              </a:spcAft>
+              <a:buClrTx/>
+              <a:buSzTx/>
+              <a:buFontTx/>
+              <a:buNone/>
+              <a:tabLst/>
+              <a:defRPr kumimoji="0" sz="1800" b="0" i="0" u="none" strike="noStrike" cap="none" spc="0" normalizeH="0" baseline="0">
+                <a:ln>
+                  <a:noFill/>
+                </a:ln>
+                <a:solidFill>
+                  <a:srgbClr val="000000"/>
+                </a:solidFill>
+                <a:effectLst/>
+                <a:uFillTx/>
+                <a:latin typeface="+mn-lt"/>
+                <a:ea typeface="+mn-ea"/>
+                <a:cs typeface="+mn-cs"/>
+                <a:sym typeface="Calibri"/>
+              </a:defRPr>
+            </a:lvl9pPr>
+          </a:lstStyle>
+          <a:p>
+            <a:r>
+              <a:rPr dirty="0"/>
+              <a:t>CONVERSION</a:t>
+            </a:r>
+          </a:p>
+        </p:txBody>
+      </p:sp>
     </p:spTree>
     <p:extLst>
       <p:ext uri="{BB962C8B-B14F-4D97-AF65-F5344CB8AC3E}">
-        <p14:creationId xmlns:p14="http://schemas.microsoft.com/office/powerpoint/2010/main" val="67827862"/>
+        <p14:creationId xmlns:p14="http://schemas.microsoft.com/office/powerpoint/2010/main" val="2842224520"/>
       </p:ext>
     </p:extLst>
   </p:cSld>
@@ -7945,7 +8984,7 @@
           <p:cNvPr id="2" name="Titel 1">
             <a:extLst>
               <a:ext uri="{FF2B5EF4-FFF2-40B4-BE49-F238E27FC236}">
-                <a16:creationId xmlns:a16="http://schemas.microsoft.com/office/drawing/2014/main" id="{60F4F9F7-1F09-4688-9724-856BD95194F1}"/>
+                <a16:creationId xmlns:a16="http://schemas.microsoft.com/office/drawing/2014/main" id="{9591C612-F88B-4465-8B3F-44166E3449EA}"/>
               </a:ext>
             </a:extLst>
           </p:cNvPr>
@@ -7964,89 +9003,76 @@
             <a:pPr algn="ctr"/>
             <a:r>
               <a:rPr lang="en-US" dirty="0"/>
-              <a:t>Feature</a:t>
-            </a:r>
-            <a:r>
-              <a:rPr lang="de-DE" dirty="0"/>
-              <a:t>: </a:t>
-            </a:r>
-            <a:r>
-              <a:rPr lang="de-DE" dirty="0" err="1"/>
-              <a:t>scaled</a:t>
-            </a:r>
-            <a:r>
-              <a:rPr lang="de-DE" dirty="0"/>
-              <a:t> Values</a:t>
-            </a:r>
+              <a:t>Feature: raw scores</a:t>
+            </a:r>
+          </a:p>
+        </p:txBody>
+      </p:sp>
+      <p:sp>
+        <p:nvSpPr>
+          <p:cNvPr id="3" name="Inhaltsplatzhalter 2">
+            <a:extLst>
+              <a:ext uri="{FF2B5EF4-FFF2-40B4-BE49-F238E27FC236}">
+                <a16:creationId xmlns:a16="http://schemas.microsoft.com/office/drawing/2014/main" id="{5B3C0166-0693-45E2-8540-A3B3EA29A65E}"/>
+              </a:ext>
+            </a:extLst>
+          </p:cNvPr>
+          <p:cNvSpPr>
+            <a:spLocks noGrp="1"/>
+          </p:cNvSpPr>
+          <p:nvPr>
+            <p:ph idx="1"/>
+          </p:nvPr>
+        </p:nvSpPr>
+        <p:spPr/>
+        <p:txBody>
+          <a:bodyPr/>
+          <a:lstStyle/>
+          <a:p>
+            <a:r>
+              <a:rPr lang="en-US" dirty="0"/>
+              <a:t>Predicts similar to random</a:t>
+            </a:r>
+          </a:p>
+          <a:p>
+            <a:r>
+              <a:rPr lang="en-US" dirty="0"/>
+              <a:t>Problem: Too little Information to get meaningful results</a:t>
+            </a:r>
+          </a:p>
+          <a:p>
+            <a:r>
+              <a:rPr lang="en-US" dirty="0"/>
+              <a:t>Solution: input raw scores</a:t>
+            </a:r>
+          </a:p>
+          <a:p>
             <a:endParaRPr lang="en-US" dirty="0"/>
           </a:p>
-        </p:txBody>
-      </p:sp>
-      <p:sp>
-        <p:nvSpPr>
-          <p:cNvPr id="3" name="Inhaltsplatzhalter 2">
-            <a:extLst>
-              <a:ext uri="{FF2B5EF4-FFF2-40B4-BE49-F238E27FC236}">
-                <a16:creationId xmlns:a16="http://schemas.microsoft.com/office/drawing/2014/main" id="{DABFB4CD-55BA-4B9D-9388-099CEA4FC0CC}"/>
-              </a:ext>
-            </a:extLst>
-          </p:cNvPr>
-          <p:cNvSpPr>
-            <a:spLocks noGrp="1"/>
-          </p:cNvSpPr>
-          <p:nvPr>
-            <p:ph idx="1"/>
-          </p:nvPr>
-        </p:nvSpPr>
-        <p:spPr/>
-        <p:txBody>
-          <a:bodyPr/>
-          <a:lstStyle/>
-          <a:p>
-            <a:r>
-              <a:rPr lang="en-US" dirty="0"/>
-              <a:t>BLOSUM scores are very small compared to SNAP scores</a:t>
-            </a:r>
+          <a:p>
+            <a:endParaRPr lang="en-US" dirty="0"/>
           </a:p>
           <a:p>
             <a:pPr marL="0" indent="0">
               <a:buNone/>
             </a:pPr>
-            <a:endParaRPr lang="en-US" dirty="0"/>
+            <a:r>
+              <a:rPr lang="en-US" dirty="0"/>
+              <a:t>[48, -1, 75, -1, 70, -2, 79, -3, 36, -1, 58, 0, 76, -2, 73, -3, 67, -2, 15, 1, </a:t>
+            </a:r>
           </a:p>
           <a:p>
             <a:pPr marL="0" indent="0">
               <a:buNone/>
             </a:pPr>
+            <a:r>
+              <a:rPr lang="en-US" dirty="0"/>
+              <a:t>    24, 2, 76, -1, 0, 0, 30, 0, 79, -2, 65, -1, 62, -1, 68, -1, 51, -1, 27, 1]</a:t>
+            </a:r>
+          </a:p>
+          <a:p>
             <a:endParaRPr lang="en-US" dirty="0"/>
           </a:p>
-          <a:p>
-            <a:pPr marL="0" indent="0">
-              <a:buNone/>
-            </a:pPr>
-            <a:r>
-              <a:rPr lang="en-US" dirty="0"/>
-              <a:t>[48, -25, 75, -25, 70, -50, 79, -75, 36, -25, 58, 0, 76, -50, 73, -75, 67, </a:t>
-            </a:r>
-          </a:p>
-          <a:p>
-            <a:pPr marL="0" indent="0">
-              <a:buNone/>
-            </a:pPr>
-            <a:r>
-              <a:rPr lang="en-US" dirty="0"/>
-              <a:t>   -50, 15, 33, 24, 66, 76, -25, 0, 0, 30, 0, 79, -50, 65, -25, 62, -25, 68, </a:t>
-            </a:r>
-          </a:p>
-          <a:p>
-            <a:pPr marL="0" indent="0">
-              <a:buNone/>
-            </a:pPr>
-            <a:r>
-              <a:rPr lang="en-US" dirty="0"/>
-              <a:t>   -25, 51, -25, 27, 33]</a:t>
-            </a:r>
-          </a:p>
         </p:txBody>
       </p:sp>
       <p:sp>
@@ -8054,7 +9080,7 @@
           <p:cNvPr id="4" name="Foliennummernplatzhalter 3">
             <a:extLst>
               <a:ext uri="{FF2B5EF4-FFF2-40B4-BE49-F238E27FC236}">
-                <a16:creationId xmlns:a16="http://schemas.microsoft.com/office/drawing/2014/main" id="{CBB3139C-6890-4543-90A0-FAE3AA3EE102}"/>
+                <a16:creationId xmlns:a16="http://schemas.microsoft.com/office/drawing/2014/main" id="{74F85361-5C17-48B6-93DB-1EDA5C35426C}"/>
               </a:ext>
             </a:extLst>
           </p:cNvPr>
@@ -8081,7 +9107,7 @@
     </p:spTree>
     <p:extLst>
       <p:ext uri="{BB962C8B-B14F-4D97-AF65-F5344CB8AC3E}">
-        <p14:creationId xmlns:p14="http://schemas.microsoft.com/office/powerpoint/2010/main" val="2783528183"/>
+        <p14:creationId xmlns:p14="http://schemas.microsoft.com/office/powerpoint/2010/main" val="67827862"/>
       </p:ext>
     </p:extLst>
   </p:cSld>
@@ -8110,6 +9136,174 @@
       </p:grpSpPr>
       <p:sp>
         <p:nvSpPr>
+          <p:cNvPr id="2" name="Titel 1">
+            <a:extLst>
+              <a:ext uri="{FF2B5EF4-FFF2-40B4-BE49-F238E27FC236}">
+                <a16:creationId xmlns:a16="http://schemas.microsoft.com/office/drawing/2014/main" id="{60F4F9F7-1F09-4688-9724-856BD95194F1}"/>
+              </a:ext>
+            </a:extLst>
+          </p:cNvPr>
+          <p:cNvSpPr>
+            <a:spLocks noGrp="1"/>
+          </p:cNvSpPr>
+          <p:nvPr>
+            <p:ph type="title"/>
+          </p:nvPr>
+        </p:nvSpPr>
+        <p:spPr/>
+        <p:txBody>
+          <a:bodyPr/>
+          <a:lstStyle/>
+          <a:p>
+            <a:pPr algn="ctr"/>
+            <a:r>
+              <a:rPr lang="en-US" dirty="0"/>
+              <a:t>Feature</a:t>
+            </a:r>
+            <a:r>
+              <a:rPr lang="de-DE" dirty="0"/>
+              <a:t>: </a:t>
+            </a:r>
+            <a:r>
+              <a:rPr lang="de-DE" dirty="0" err="1"/>
+              <a:t>scaled</a:t>
+            </a:r>
+            <a:r>
+              <a:rPr lang="de-DE" dirty="0"/>
+              <a:t> Values</a:t>
+            </a:r>
+            <a:endParaRPr lang="en-US" dirty="0"/>
+          </a:p>
+        </p:txBody>
+      </p:sp>
+      <p:sp>
+        <p:nvSpPr>
+          <p:cNvPr id="3" name="Inhaltsplatzhalter 2">
+            <a:extLst>
+              <a:ext uri="{FF2B5EF4-FFF2-40B4-BE49-F238E27FC236}">
+                <a16:creationId xmlns:a16="http://schemas.microsoft.com/office/drawing/2014/main" id="{DABFB4CD-55BA-4B9D-9388-099CEA4FC0CC}"/>
+              </a:ext>
+            </a:extLst>
+          </p:cNvPr>
+          <p:cNvSpPr>
+            <a:spLocks noGrp="1"/>
+          </p:cNvSpPr>
+          <p:nvPr>
+            <p:ph idx="1"/>
+          </p:nvPr>
+        </p:nvSpPr>
+        <p:spPr/>
+        <p:txBody>
+          <a:bodyPr/>
+          <a:lstStyle/>
+          <a:p>
+            <a:r>
+              <a:rPr lang="en-US" dirty="0"/>
+              <a:t>BLOSUM scores are very small compared to SNAP scores</a:t>
+            </a:r>
+          </a:p>
+          <a:p>
+            <a:pPr marL="0" indent="0">
+              <a:buNone/>
+            </a:pPr>
+            <a:endParaRPr lang="en-US" dirty="0"/>
+          </a:p>
+          <a:p>
+            <a:pPr marL="0" indent="0">
+              <a:buNone/>
+            </a:pPr>
+            <a:endParaRPr lang="en-US" dirty="0"/>
+          </a:p>
+          <a:p>
+            <a:pPr marL="0" indent="0">
+              <a:buNone/>
+            </a:pPr>
+            <a:r>
+              <a:rPr lang="en-US" dirty="0"/>
+              <a:t>[48, -25, 75, -25, 70, -50, 79, -75, 36, -25, 58, 0, 76, -50, 73, -75, 67, </a:t>
+            </a:r>
+          </a:p>
+          <a:p>
+            <a:pPr marL="0" indent="0">
+              <a:buNone/>
+            </a:pPr>
+            <a:r>
+              <a:rPr lang="en-US" dirty="0"/>
+              <a:t>   -50, 15, 33, 24, 66, 76, -25, 0, 0, 30, 0, 79, -50, 65, -25, 62, -25, 68, </a:t>
+            </a:r>
+          </a:p>
+          <a:p>
+            <a:pPr marL="0" indent="0">
+              <a:buNone/>
+            </a:pPr>
+            <a:r>
+              <a:rPr lang="en-US" dirty="0"/>
+              <a:t>   -25, 51, -25, 27, 33]</a:t>
+            </a:r>
+          </a:p>
+        </p:txBody>
+      </p:sp>
+      <p:sp>
+        <p:nvSpPr>
+          <p:cNvPr id="4" name="Foliennummernplatzhalter 3">
+            <a:extLst>
+              <a:ext uri="{FF2B5EF4-FFF2-40B4-BE49-F238E27FC236}">
+                <a16:creationId xmlns:a16="http://schemas.microsoft.com/office/drawing/2014/main" id="{CBB3139C-6890-4543-90A0-FAE3AA3EE102}"/>
+              </a:ext>
+            </a:extLst>
+          </p:cNvPr>
+          <p:cNvSpPr>
+            <a:spLocks noGrp="1"/>
+          </p:cNvSpPr>
+          <p:nvPr>
+            <p:ph type="sldNum" sz="quarter" idx="12"/>
+          </p:nvPr>
+        </p:nvSpPr>
+        <p:spPr/>
+        <p:txBody>
+          <a:bodyPr/>
+          <a:lstStyle/>
+          <a:p>
+            <a:fld id="{CCAAE293-A3DA-4FFC-871C-7F0F209F7CB2}" type="slidenum">
+              <a:rPr lang="en-US" smtClean="0"/>
+              <a:t>8</a:t>
+            </a:fld>
+            <a:endParaRPr lang="en-US"/>
+          </a:p>
+        </p:txBody>
+      </p:sp>
+    </p:spTree>
+    <p:extLst>
+      <p:ext uri="{BB962C8B-B14F-4D97-AF65-F5344CB8AC3E}">
+        <p14:creationId xmlns:p14="http://schemas.microsoft.com/office/powerpoint/2010/main" val="2783528183"/>
+      </p:ext>
+    </p:extLst>
+  </p:cSld>
+  <p:clrMapOvr>
+    <a:masterClrMapping/>
+  </p:clrMapOvr>
+</p:sld>
+</file>
+
+<file path=ppt/slides/slide9.xml><?xml version="1.0" encoding="utf-8"?>
+<p:sld xmlns:a="http://schemas.openxmlformats.org/drawingml/2006/main" xmlns:r="http://schemas.openxmlformats.org/officeDocument/2006/relationships" xmlns:p="http://schemas.openxmlformats.org/presentationml/2006/main">
+  <p:cSld>
+    <p:spTree>
+      <p:nvGrpSpPr>
+        <p:cNvPr id="1" name=""/>
+        <p:cNvGrpSpPr/>
+        <p:nvPr/>
+      </p:nvGrpSpPr>
+      <p:grpSpPr>
+        <a:xfrm>
+          <a:off x="0" y="0"/>
+          <a:ext cx="0" cy="0"/>
+          <a:chOff x="0" y="0"/>
+          <a:chExt cx="0" cy="0"/>
+        </a:xfrm>
+      </p:grpSpPr>
+      <p:sp>
+        <p:nvSpPr>
           <p:cNvPr id="6" name="Titel 5">
             <a:extLst>
               <a:ext uri="{FF2B5EF4-FFF2-40B4-BE49-F238E27FC236}">
@@ -8275,7 +9469,7 @@
           <a:p>
             <a:fld id="{CCAAE293-A3DA-4FFC-871C-7F0F209F7CB2}" type="slidenum">
               <a:rPr lang="en-US" smtClean="0"/>
-              <a:t>8</a:t>
+              <a:t>9</a:t>
             </a:fld>
             <a:endParaRPr lang="en-US"/>
           </a:p>
@@ -8515,204 +9709,6 @@
     <p:extLst>
       <p:ext uri="{BB962C8B-B14F-4D97-AF65-F5344CB8AC3E}">
         <p14:creationId xmlns:p14="http://schemas.microsoft.com/office/powerpoint/2010/main" val="396671851"/>
-      </p:ext>
-    </p:extLst>
-  </p:cSld>
-  <p:clrMapOvr>
-    <a:masterClrMapping/>
-  </p:clrMapOvr>
-</p:sld>
-</file>
-
-<file path=ppt/slides/slide9.xml><?xml version="1.0" encoding="utf-8"?>
-<p:sld xmlns:a="http://schemas.openxmlformats.org/drawingml/2006/main" xmlns:r="http://schemas.openxmlformats.org/officeDocument/2006/relationships" xmlns:p="http://schemas.openxmlformats.org/presentationml/2006/main">
-  <p:cSld>
-    <p:spTree>
-      <p:nvGrpSpPr>
-        <p:cNvPr id="1" name=""/>
-        <p:cNvGrpSpPr/>
-        <p:nvPr/>
-      </p:nvGrpSpPr>
-      <p:grpSpPr>
-        <a:xfrm>
-          <a:off x="0" y="0"/>
-          <a:ext cx="0" cy="0"/>
-          <a:chOff x="0" y="0"/>
-          <a:chExt cx="0" cy="0"/>
-        </a:xfrm>
-      </p:grpSpPr>
-      <p:sp>
-        <p:nvSpPr>
-          <p:cNvPr id="2" name="Titel 1">
-            <a:extLst>
-              <a:ext uri="{FF2B5EF4-FFF2-40B4-BE49-F238E27FC236}">
-                <a16:creationId xmlns:a16="http://schemas.microsoft.com/office/drawing/2014/main" id="{90DA7BD1-7036-4062-A3E7-109EE85AC270}"/>
-              </a:ext>
-            </a:extLst>
-          </p:cNvPr>
-          <p:cNvSpPr>
-            <a:spLocks noGrp="1"/>
-          </p:cNvSpPr>
-          <p:nvPr>
-            <p:ph type="title"/>
-          </p:nvPr>
-        </p:nvSpPr>
-        <p:spPr/>
-        <p:txBody>
-          <a:bodyPr/>
-          <a:lstStyle/>
-          <a:p>
-            <a:pPr algn="ctr"/>
-            <a:r>
-              <a:rPr lang="de-DE" dirty="0"/>
-              <a:t>Hyperparameter</a:t>
-            </a:r>
-            <a:endParaRPr lang="en-US" dirty="0"/>
-          </a:p>
-        </p:txBody>
-      </p:sp>
-      <p:sp>
-        <p:nvSpPr>
-          <p:cNvPr id="3" name="Inhaltsplatzhalter 2">
-            <a:extLst>
-              <a:ext uri="{FF2B5EF4-FFF2-40B4-BE49-F238E27FC236}">
-                <a16:creationId xmlns:a16="http://schemas.microsoft.com/office/drawing/2014/main" id="{08A62452-8D0B-487B-BF6E-8C680AB179B6}"/>
-              </a:ext>
-            </a:extLst>
-          </p:cNvPr>
-          <p:cNvSpPr>
-            <a:spLocks noGrp="1"/>
-          </p:cNvSpPr>
-          <p:nvPr>
-            <p:ph idx="1"/>
-          </p:nvPr>
-        </p:nvSpPr>
-        <p:spPr/>
-        <p:txBody>
-          <a:bodyPr>
-            <a:normAutofit fontScale="92500" lnSpcReduction="20000"/>
-          </a:bodyPr>
-          <a:lstStyle/>
-          <a:p>
-            <a:r>
-              <a:rPr lang="de-DE" dirty="0" err="1"/>
-              <a:t>Weigths</a:t>
-            </a:r>
-            <a:r>
-              <a:rPr lang="de-DE" dirty="0"/>
-              <a:t>: </a:t>
-            </a:r>
-          </a:p>
-          <a:p>
-            <a:pPr lvl="1"/>
-            <a:r>
-              <a:rPr lang="de-DE" dirty="0"/>
-              <a:t>Binding: 0.6</a:t>
-            </a:r>
-          </a:p>
-          <a:p>
-            <a:pPr lvl="1"/>
-            <a:r>
-              <a:rPr lang="de-DE" dirty="0"/>
-              <a:t>Non-</a:t>
-            </a:r>
-            <a:r>
-              <a:rPr lang="de-DE" dirty="0" err="1"/>
-              <a:t>binding</a:t>
-            </a:r>
-            <a:r>
-              <a:rPr lang="de-DE" dirty="0"/>
-              <a:t>: 0.4</a:t>
-            </a:r>
-          </a:p>
-          <a:p>
-            <a:endParaRPr lang="de-DE" dirty="0"/>
-          </a:p>
-          <a:p>
-            <a:r>
-              <a:rPr lang="de-DE" dirty="0"/>
-              <a:t>Learning rate: 0.003</a:t>
-            </a:r>
-          </a:p>
-          <a:p>
-            <a:endParaRPr lang="de-DE" dirty="0"/>
-          </a:p>
-          <a:p>
-            <a:r>
-              <a:rPr lang="de-DE" dirty="0" err="1"/>
-              <a:t>Prediction</a:t>
-            </a:r>
-            <a:r>
-              <a:rPr lang="de-DE" dirty="0"/>
-              <a:t> </a:t>
-            </a:r>
-            <a:r>
-              <a:rPr lang="de-DE" dirty="0" err="1"/>
-              <a:t>Cutoff</a:t>
-            </a:r>
-            <a:r>
-              <a:rPr lang="de-DE" dirty="0"/>
-              <a:t>: 0.4</a:t>
-            </a:r>
-          </a:p>
-          <a:p>
-            <a:endParaRPr lang="de-DE" dirty="0"/>
-          </a:p>
-          <a:p>
-            <a:r>
-              <a:rPr lang="de-DE" dirty="0"/>
-              <a:t>Momentum: 0.9</a:t>
-            </a:r>
-          </a:p>
-          <a:p>
-            <a:endParaRPr lang="de-DE" dirty="0"/>
-          </a:p>
-          <a:p>
-            <a:r>
-              <a:rPr lang="de-DE" dirty="0" err="1"/>
-              <a:t>Epochs</a:t>
-            </a:r>
-            <a:r>
-              <a:rPr lang="de-DE" dirty="0"/>
-              <a:t>: 200</a:t>
-            </a:r>
-            <a:endParaRPr lang="en-US" dirty="0"/>
-          </a:p>
-        </p:txBody>
-      </p:sp>
-      <p:sp>
-        <p:nvSpPr>
-          <p:cNvPr id="4" name="Foliennummernplatzhalter 3">
-            <a:extLst>
-              <a:ext uri="{FF2B5EF4-FFF2-40B4-BE49-F238E27FC236}">
-                <a16:creationId xmlns:a16="http://schemas.microsoft.com/office/drawing/2014/main" id="{5BC1D8A0-0EDC-4692-8350-8E5C893B0A2A}"/>
-              </a:ext>
-            </a:extLst>
-          </p:cNvPr>
-          <p:cNvSpPr>
-            <a:spLocks noGrp="1"/>
-          </p:cNvSpPr>
-          <p:nvPr>
-            <p:ph type="sldNum" sz="quarter" idx="12"/>
-          </p:nvPr>
-        </p:nvSpPr>
-        <p:spPr/>
-        <p:txBody>
-          <a:bodyPr/>
-          <a:lstStyle/>
-          <a:p>
-            <a:fld id="{CCAAE293-A3DA-4FFC-871C-7F0F209F7CB2}" type="slidenum">
-              <a:rPr lang="en-US" smtClean="0"/>
-              <a:t>9</a:t>
-            </a:fld>
-            <a:endParaRPr lang="en-US"/>
-          </a:p>
-        </p:txBody>
-      </p:sp>
-    </p:spTree>
-    <p:extLst>
-      <p:ext uri="{BB962C8B-B14F-4D97-AF65-F5344CB8AC3E}">
-        <p14:creationId xmlns:p14="http://schemas.microsoft.com/office/powerpoint/2010/main" val="3829208825"/>
       </p:ext>
     </p:extLst>
   </p:cSld>

</xml_diff>